<commit_message>
Added Softwares used section in IoT Project ppt
</commit_message>
<xml_diff>
--- a/Presentations/ARM_PPTs/Ch4_ARMv8_Registers.pptx
+++ b/Presentations/ARM_PPTs/Ch4_ARMv8_Registers.pptx
@@ -6,16 +6,9 @@
   </p:sldMasterIdLst>
   <p:sldIdLst>
     <p:sldId id="256" r:id="rId2"/>
-    <p:sldId id="257" r:id="rId3"/>
-    <p:sldId id="258" r:id="rId4"/>
-    <p:sldId id="259" r:id="rId5"/>
-    <p:sldId id="260" r:id="rId6"/>
-    <p:sldId id="265" r:id="rId7"/>
-    <p:sldId id="266" r:id="rId8"/>
-    <p:sldId id="261" r:id="rId9"/>
-    <p:sldId id="262" r:id="rId10"/>
-    <p:sldId id="263" r:id="rId11"/>
-    <p:sldId id="264" r:id="rId12"/>
+    <p:sldId id="262" r:id="rId3"/>
+    <p:sldId id="263" r:id="rId4"/>
+    <p:sldId id="264" r:id="rId5"/>
   </p:sldIdLst>
   <p:sldSz cx="12192000" cy="6858000"/>
   <p:notesSz cx="6858000" cy="9144000"/>
@@ -5800,7 +5793,20 @@
             <a:pPr algn="ctr"/>
             <a:r>
               <a:rPr lang="en-US" dirty="0"/>
-              <a:t>ARMv8 Registers</a:t>
+              <a:t>ARMv8 </a:t>
+            </a:r>
+            <a:br>
+              <a:rPr lang="en-US" dirty="0"/>
+            </a:br>
+            <a:r>
+              <a:rPr lang="en-US" b="1" dirty="0">
+                <a:latin typeface="Arial-BoldMT"/>
+              </a:rPr>
+              <a:t>Core Architecture  + </a:t>
+            </a:r>
+            <a:r>
+              <a:rPr lang="en-US" dirty="0"/>
+              <a:t>Registers</a:t>
             </a:r>
           </a:p>
         </p:txBody>
@@ -5844,128 +5850,6 @@
     <p:extLst>
       <p:ext uri="{BB962C8B-B14F-4D97-AF65-F5344CB8AC3E}">
         <p14:creationId xmlns:p14="http://schemas.microsoft.com/office/powerpoint/2010/main" val="3750661658"/>
-      </p:ext>
-    </p:extLst>
-  </p:cSld>
-  <p:clrMapOvr>
-    <a:masterClrMapping/>
-  </p:clrMapOvr>
-</p:sld>
-</file>
-
-<file path=ppt/slides/slide10.xml><?xml version="1.0" encoding="utf-8"?>
-<p:sld xmlns:a="http://schemas.openxmlformats.org/drawingml/2006/main" xmlns:r="http://schemas.openxmlformats.org/officeDocument/2006/relationships" xmlns:p="http://schemas.openxmlformats.org/presentationml/2006/main">
-  <p:cSld>
-    <p:spTree>
-      <p:nvGrpSpPr>
-        <p:cNvPr id="1" name=""/>
-        <p:cNvGrpSpPr/>
-        <p:nvPr/>
-      </p:nvGrpSpPr>
-      <p:grpSpPr>
-        <a:xfrm>
-          <a:off x="0" y="0"/>
-          <a:ext cx="0" cy="0"/>
-          <a:chOff x="0" y="0"/>
-          <a:chExt cx="0" cy="0"/>
-        </a:xfrm>
-      </p:grpSpPr>
-      <p:sp>
-        <p:nvSpPr>
-          <p:cNvPr id="4" name="Rectangle 3"/>
-          <p:cNvSpPr/>
-          <p:nvPr/>
-        </p:nvSpPr>
-        <p:spPr>
-          <a:xfrm>
-            <a:off x="265286" y="316496"/>
-            <a:ext cx="9010599" cy="369332"/>
-          </a:xfrm>
-          <a:prstGeom prst="rect">
-            <a:avLst/>
-          </a:prstGeom>
-        </p:spPr>
-        <p:txBody>
-          <a:bodyPr wrap="square">
-            <a:spAutoFit/>
-          </a:bodyPr>
-          <a:lstStyle/>
-          <a:p>
-            <a:r>
-              <a:rPr lang="en-US" b="1" dirty="0">
-                <a:latin typeface="Arial-BoldMT"/>
-              </a:rPr>
-              <a:t>Fundamentals of ARMv8</a:t>
-            </a:r>
-            <a:endParaRPr lang="en-US" dirty="0"/>
-          </a:p>
-        </p:txBody>
-      </p:sp>
-    </p:spTree>
-    <p:extLst>
-      <p:ext uri="{BB962C8B-B14F-4D97-AF65-F5344CB8AC3E}">
-        <p14:creationId xmlns:p14="http://schemas.microsoft.com/office/powerpoint/2010/main" val="4005841578"/>
-      </p:ext>
-    </p:extLst>
-  </p:cSld>
-  <p:clrMapOvr>
-    <a:masterClrMapping/>
-  </p:clrMapOvr>
-</p:sld>
-</file>
-
-<file path=ppt/slides/slide11.xml><?xml version="1.0" encoding="utf-8"?>
-<p:sld xmlns:a="http://schemas.openxmlformats.org/drawingml/2006/main" xmlns:r="http://schemas.openxmlformats.org/officeDocument/2006/relationships" xmlns:p="http://schemas.openxmlformats.org/presentationml/2006/main">
-  <p:cSld>
-    <p:spTree>
-      <p:nvGrpSpPr>
-        <p:cNvPr id="1" name=""/>
-        <p:cNvGrpSpPr/>
-        <p:nvPr/>
-      </p:nvGrpSpPr>
-      <p:grpSpPr>
-        <a:xfrm>
-          <a:off x="0" y="0"/>
-          <a:ext cx="0" cy="0"/>
-          <a:chOff x="0" y="0"/>
-          <a:chExt cx="0" cy="0"/>
-        </a:xfrm>
-      </p:grpSpPr>
-      <p:sp>
-        <p:nvSpPr>
-          <p:cNvPr id="4" name="Rectangle 3"/>
-          <p:cNvSpPr/>
-          <p:nvPr/>
-        </p:nvSpPr>
-        <p:spPr>
-          <a:xfrm>
-            <a:off x="265286" y="316496"/>
-            <a:ext cx="9010599" cy="369332"/>
-          </a:xfrm>
-          <a:prstGeom prst="rect">
-            <a:avLst/>
-          </a:prstGeom>
-        </p:spPr>
-        <p:txBody>
-          <a:bodyPr wrap="square">
-            <a:spAutoFit/>
-          </a:bodyPr>
-          <a:lstStyle/>
-          <a:p>
-            <a:r>
-              <a:rPr lang="en-US" b="1" dirty="0">
-                <a:latin typeface="Arial-BoldMT"/>
-              </a:rPr>
-              <a:t>Fundamentals of ARMv8</a:t>
-            </a:r>
-            <a:endParaRPr lang="en-US" dirty="0"/>
-          </a:p>
-        </p:txBody>
-      </p:sp>
-    </p:spTree>
-    <p:extLst>
-      <p:ext uri="{BB962C8B-B14F-4D97-AF65-F5344CB8AC3E}">
-        <p14:creationId xmlns:p14="http://schemas.microsoft.com/office/powerpoint/2010/main" val="500158562"/>
       </p:ext>
     </p:extLst>
   </p:cSld>
@@ -6017,269 +5901,16 @@
               <a:rPr lang="en-US" b="1" dirty="0">
                 <a:latin typeface="Arial-BoldMT"/>
               </a:rPr>
-              <a:t>Fundamentals of ARMv8 – Exception Levels</a:t>
-            </a:r>
-            <a:endParaRPr lang="en-US" dirty="0"/>
-          </a:p>
-        </p:txBody>
-      </p:sp>
-      <p:sp>
-        <p:nvSpPr>
-          <p:cNvPr id="5" name="Rectangle 4"/>
-          <p:cNvSpPr/>
-          <p:nvPr/>
-        </p:nvSpPr>
-        <p:spPr>
-          <a:xfrm>
-            <a:off x="705815" y="1090219"/>
-            <a:ext cx="6218434" cy="1477328"/>
-          </a:xfrm>
-          <a:prstGeom prst="rect">
-            <a:avLst/>
-          </a:prstGeom>
-        </p:spPr>
-        <p:txBody>
-          <a:bodyPr wrap="none">
-            <a:spAutoFit/>
-          </a:bodyPr>
-          <a:lstStyle/>
-          <a:p>
-            <a:pPr marL="285750" indent="-285750" algn="just">
-              <a:buFont typeface="Arial" panose="020B0604020202020204" pitchFamily="34" charset="0"/>
-              <a:buChar char="•"/>
-            </a:pPr>
-            <a:r>
-              <a:rPr lang="en-US" dirty="0">
-                <a:latin typeface="TimesNewRomanPSMT"/>
-              </a:rPr>
-              <a:t>In ARMv8, execution occurs at one of four </a:t>
-            </a:r>
-            <a:r>
-              <a:rPr lang="en-US" i="1" dirty="0">
-                <a:latin typeface="TimesNewRomanPS-ItalicMT"/>
-              </a:rPr>
-              <a:t>Exception levels…</a:t>
-            </a:r>
-          </a:p>
-          <a:p>
-            <a:pPr algn="just"/>
-            <a:endParaRPr lang="en-US" b="1" dirty="0"/>
-          </a:p>
-          <a:p>
-            <a:pPr algn="just"/>
-            <a:r>
-              <a:rPr lang="en-US" b="1" dirty="0"/>
-              <a:t>	</a:t>
-            </a:r>
-            <a:r>
-              <a:rPr lang="en-US" sz="1200" b="1" dirty="0"/>
-              <a:t>EL0 - </a:t>
-            </a:r>
-            <a:r>
-              <a:rPr lang="en-US" sz="1200" dirty="0"/>
-              <a:t>Normal user applications.</a:t>
-            </a:r>
-          </a:p>
-          <a:p>
-            <a:pPr algn="just"/>
-            <a:r>
-              <a:rPr lang="en-US" sz="1200" b="1" dirty="0"/>
-              <a:t>	EL1 - </a:t>
-            </a:r>
-            <a:r>
-              <a:rPr lang="en-US" sz="1200" dirty="0"/>
-              <a:t>Operating system kernel typically described as </a:t>
-            </a:r>
-            <a:r>
-              <a:rPr lang="en-US" sz="1200" i="1" dirty="0"/>
-              <a:t>privileged</a:t>
-            </a:r>
-            <a:r>
-              <a:rPr lang="en-US" sz="1200" dirty="0"/>
-              <a:t>.</a:t>
-            </a:r>
-          </a:p>
-          <a:p>
-            <a:pPr algn="just"/>
-            <a:r>
-              <a:rPr lang="en-US" sz="1200" b="1" dirty="0"/>
-              <a:t>	EL2 - </a:t>
-            </a:r>
-            <a:r>
-              <a:rPr lang="en-US" sz="1200" dirty="0"/>
-              <a:t>Hypervisor.</a:t>
-            </a:r>
-          </a:p>
-          <a:p>
-            <a:pPr algn="just"/>
-            <a:r>
-              <a:rPr lang="en-US" sz="1200" b="1" dirty="0"/>
-              <a:t>	EL3 - </a:t>
-            </a:r>
-            <a:r>
-              <a:rPr lang="en-US" sz="1200" dirty="0"/>
-              <a:t>Low-level firmware, including the Secure Monitor.</a:t>
-            </a:r>
-          </a:p>
-        </p:txBody>
-      </p:sp>
-      <p:pic>
-        <p:nvPicPr>
-          <p:cNvPr id="6" name="Picture 5"/>
-          <p:cNvPicPr>
-            <a:picLocks noChangeAspect="1"/>
-          </p:cNvPicPr>
-          <p:nvPr/>
-        </p:nvPicPr>
-        <p:blipFill>
-          <a:blip r:embed="rId2"/>
-          <a:stretch>
-            <a:fillRect/>
-          </a:stretch>
-        </p:blipFill>
-        <p:spPr>
-          <a:xfrm>
-            <a:off x="1715295" y="3084635"/>
-            <a:ext cx="5250978" cy="3380922"/>
-          </a:xfrm>
-          <a:prstGeom prst="rect">
-            <a:avLst/>
-          </a:prstGeom>
-          <a:effectLst>
-            <a:outerShdw blurRad="63500" sx="102000" sy="102000" algn="ctr" rotWithShape="0">
-              <a:prstClr val="black">
-                <a:alpha val="40000"/>
-              </a:prstClr>
-            </a:outerShdw>
-          </a:effectLst>
-        </p:spPr>
-      </p:pic>
-      <p:sp>
-        <p:nvSpPr>
-          <p:cNvPr id="8" name="Rectangle: Rounded Corners 7"/>
-          <p:cNvSpPr/>
-          <p:nvPr/>
-        </p:nvSpPr>
-        <p:spPr>
-          <a:xfrm>
-            <a:off x="7296703" y="4775096"/>
-            <a:ext cx="3596054" cy="1732085"/>
-          </a:xfrm>
-          <a:prstGeom prst="roundRect">
-            <a:avLst/>
-          </a:prstGeom>
-        </p:spPr>
-        <p:style>
-          <a:lnRef idx="2">
-            <a:schemeClr val="accent1">
-              <a:shade val="50000"/>
-            </a:schemeClr>
-          </a:lnRef>
-          <a:fillRef idx="1">
-            <a:schemeClr val="accent1"/>
-          </a:fillRef>
-          <a:effectRef idx="0">
-            <a:schemeClr val="accent1"/>
-          </a:effectRef>
-          <a:fontRef idx="minor">
-            <a:schemeClr val="lt1"/>
-          </a:fontRef>
-        </p:style>
-        <p:txBody>
-          <a:bodyPr rtlCol="0" anchor="ctr"/>
-          <a:lstStyle/>
-          <a:p>
-            <a:pPr algn="just"/>
-            <a:r>
-              <a:rPr lang="en-US" sz="1200" dirty="0">
-                <a:latin typeface="TimesNewRomanPSMT"/>
-              </a:rPr>
-              <a:t>An application ,  Kernel of an operating system or a Hypervisor, each execute in their respective Exception level. </a:t>
-            </a:r>
-          </a:p>
-          <a:p>
-            <a:pPr algn="just"/>
-            <a:endParaRPr lang="en-US" sz="1200" dirty="0">
-              <a:latin typeface="TimesNewRomanPSMT"/>
-            </a:endParaRPr>
-          </a:p>
-          <a:p>
-            <a:pPr algn="just"/>
-            <a:r>
-              <a:rPr lang="en-US" sz="1200" dirty="0">
-                <a:latin typeface="TimesNewRomanPSMT"/>
-              </a:rPr>
-              <a:t>An exception to this rule is </a:t>
-            </a:r>
-            <a:r>
-              <a:rPr lang="en-US" sz="1200" b="1" dirty="0">
-                <a:latin typeface="TimesNewRomanPSMT"/>
-              </a:rPr>
-              <a:t>in-kernel hypervisors</a:t>
-            </a:r>
-          </a:p>
-          <a:p>
-            <a:pPr algn="just"/>
-            <a:r>
-              <a:rPr lang="en-US" sz="1200" dirty="0">
-                <a:latin typeface="TimesNewRomanPSMT"/>
-              </a:rPr>
-              <a:t>such as </a:t>
-            </a:r>
-            <a:r>
-              <a:rPr lang="en-US" sz="1200" b="1" dirty="0">
-                <a:latin typeface="TimesNewRomanPSMT"/>
-              </a:rPr>
-              <a:t>KVM</a:t>
-            </a:r>
-            <a:r>
-              <a:rPr lang="en-US" sz="1200" dirty="0">
-                <a:latin typeface="TimesNewRomanPSMT"/>
-              </a:rPr>
-              <a:t>, which operate across </a:t>
-            </a:r>
-            <a:r>
-              <a:rPr lang="en-US" sz="1200" i="1" dirty="0">
-                <a:latin typeface="TimesNewRomanPS-ItalicMT"/>
-              </a:rPr>
-              <a:t>both </a:t>
-            </a:r>
-            <a:r>
-              <a:rPr lang="en-US" sz="1200" b="1" dirty="0">
-                <a:latin typeface="TimesNewRomanPSMT"/>
-              </a:rPr>
-              <a:t>EL2</a:t>
-            </a:r>
-            <a:r>
-              <a:rPr lang="en-US" sz="1200" dirty="0">
-                <a:latin typeface="TimesNewRomanPSMT"/>
-              </a:rPr>
-              <a:t> and </a:t>
-            </a:r>
-            <a:r>
-              <a:rPr lang="en-US" sz="1200" b="1" dirty="0">
-                <a:latin typeface="TimesNewRomanPSMT"/>
-              </a:rPr>
-              <a:t>EL1</a:t>
-            </a:r>
-            <a:r>
-              <a:rPr lang="en-US" sz="1200" dirty="0">
-                <a:latin typeface="TimesNewRomanPSMT"/>
-              </a:rPr>
-              <a:t>.</a:t>
-            </a:r>
-            <a:endParaRPr lang="en-US" sz="1200" dirty="0"/>
-          </a:p>
-          <a:p>
-            <a:pPr algn="ctr"/>
-            <a:endParaRPr lang="en-US" sz="1200" dirty="0"/>
+              <a:t>Core Architecture of ARMv8</a:t>
+            </a:r>
+            <a:endParaRPr lang="en-US" dirty="0"/>
           </a:p>
         </p:txBody>
       </p:sp>
     </p:spTree>
     <p:extLst>
       <p:ext uri="{BB962C8B-B14F-4D97-AF65-F5344CB8AC3E}">
-        <p14:creationId xmlns:p14="http://schemas.microsoft.com/office/powerpoint/2010/main" val="1431000783"/>
+        <p14:creationId xmlns:p14="http://schemas.microsoft.com/office/powerpoint/2010/main" val="647475373"/>
       </p:ext>
     </p:extLst>
   </p:cSld>
@@ -6331,273 +5962,16 @@
               <a:rPr lang="en-US" b="1" dirty="0">
                 <a:latin typeface="Arial-BoldMT"/>
               </a:rPr>
-              <a:t>Fundamentals of ARMv8 – Security States</a:t>
-            </a:r>
-            <a:endParaRPr lang="en-US" dirty="0"/>
-          </a:p>
-        </p:txBody>
-      </p:sp>
-      <p:sp>
-        <p:nvSpPr>
-          <p:cNvPr id="2" name="Rectangle 1"/>
-          <p:cNvSpPr/>
-          <p:nvPr/>
-        </p:nvSpPr>
-        <p:spPr>
-          <a:xfrm>
-            <a:off x="265285" y="892186"/>
-            <a:ext cx="7572119" cy="2262158"/>
-          </a:xfrm>
-          <a:prstGeom prst="rect">
-            <a:avLst/>
-          </a:prstGeom>
-        </p:spPr>
-        <p:txBody>
-          <a:bodyPr wrap="square">
-            <a:spAutoFit/>
-          </a:bodyPr>
-          <a:lstStyle/>
-          <a:p>
-            <a:r>
-              <a:rPr lang="en-US" sz="1200" dirty="0">
-                <a:latin typeface="TimesNewRomanPSMT"/>
-              </a:rPr>
-              <a:t>* ARMv8-A provides two security states:</a:t>
-            </a:r>
-          </a:p>
-          <a:p>
-            <a:r>
-              <a:rPr lang="en-US" sz="1200" dirty="0">
-                <a:latin typeface="TimesNewRomanPSMT"/>
-              </a:rPr>
-              <a:t> 	* Secure and </a:t>
-            </a:r>
-          </a:p>
-          <a:p>
-            <a:r>
-              <a:rPr lang="en-US" sz="1200" dirty="0">
-                <a:latin typeface="TimesNewRomanPSMT"/>
-              </a:rPr>
-              <a:t>	* Non-secure (</a:t>
-            </a:r>
-            <a:r>
-              <a:rPr lang="en-US" sz="1200" i="1" dirty="0">
-                <a:latin typeface="TimesNewRomanPS-ItalicMT"/>
-              </a:rPr>
-              <a:t>Normal World)</a:t>
-            </a:r>
-            <a:r>
-              <a:rPr lang="en-US" sz="1200" dirty="0">
-                <a:latin typeface="TimesNewRomanPSMT"/>
-              </a:rPr>
-              <a:t> </a:t>
-            </a:r>
-          </a:p>
-          <a:p>
-            <a:endParaRPr lang="en-US" sz="1200" dirty="0">
-              <a:latin typeface="TimesNewRomanPSMT"/>
-            </a:endParaRPr>
-          </a:p>
-          <a:p>
-            <a:r>
-              <a:rPr lang="en-US" sz="1200" dirty="0">
-                <a:latin typeface="TimesNewRomanPSMT"/>
-              </a:rPr>
-              <a:t>* This enables an Operating System (OS) to run in parallel with a trusted OS on the same hardware, and provides protection against certain software attacks and hardware attacks. </a:t>
-            </a:r>
-          </a:p>
-          <a:p>
-            <a:endParaRPr lang="en-US" sz="1200" dirty="0">
-              <a:latin typeface="TimesNewRomanPSMT"/>
-            </a:endParaRPr>
-          </a:p>
-          <a:p>
-            <a:r>
-              <a:rPr lang="en-US" sz="1200" dirty="0">
-                <a:latin typeface="TimesNewRomanPSMT"/>
-              </a:rPr>
-              <a:t>* </a:t>
-            </a:r>
-            <a:r>
-              <a:rPr lang="en-US" sz="1200" b="1" dirty="0">
-                <a:latin typeface="TimesNewRomanPSMT"/>
-              </a:rPr>
-              <a:t>ARM </a:t>
-            </a:r>
-            <a:r>
-              <a:rPr lang="en-US" sz="1200" b="1" dirty="0" err="1">
-                <a:latin typeface="TimesNewRomanPSMT"/>
-              </a:rPr>
-              <a:t>TrustZone</a:t>
-            </a:r>
-            <a:r>
-              <a:rPr lang="en-US" sz="1200" dirty="0">
-                <a:latin typeface="TimesNewRomanPSMT"/>
-              </a:rPr>
-              <a:t> technology enables the system to be partitioned between the Normal and Secure worlds. </a:t>
-            </a:r>
-          </a:p>
-          <a:p>
-            <a:endParaRPr lang="en-US" sz="900" dirty="0">
-              <a:latin typeface="TimesNewRomanPSMT"/>
-            </a:endParaRPr>
-          </a:p>
-          <a:p>
-            <a:r>
-              <a:rPr lang="en-US" sz="1200" dirty="0">
-                <a:latin typeface="TimesNewRomanPSMT"/>
-              </a:rPr>
-              <a:t>* ARMv8-A also provides support for </a:t>
-            </a:r>
-            <a:r>
-              <a:rPr lang="en-US" sz="1200" b="1" dirty="0">
-                <a:latin typeface="TimesNewRomanPSMT"/>
-              </a:rPr>
-              <a:t>virtualization</a:t>
-            </a:r>
-            <a:r>
-              <a:rPr lang="en-US" sz="1200" dirty="0">
-                <a:latin typeface="TimesNewRomanPSMT"/>
-              </a:rPr>
-              <a:t>, though only in the Normal world. </a:t>
-            </a:r>
-          </a:p>
-          <a:p>
-            <a:pPr marL="628650" lvl="1" indent="-171450">
-              <a:buFont typeface="Arial" panose="020B0604020202020204" pitchFamily="34" charset="0"/>
-              <a:buChar char="•"/>
-            </a:pPr>
-            <a:r>
-              <a:rPr lang="en-US" sz="1200" dirty="0">
-                <a:latin typeface="TimesNewRomanPSMT"/>
-              </a:rPr>
-              <a:t>This means that hypervisor, or </a:t>
-            </a:r>
-            <a:r>
-              <a:rPr lang="en-US" sz="1200" b="1" dirty="0">
-                <a:latin typeface="TimesNewRomanPSMT"/>
-              </a:rPr>
-              <a:t>Virtual Machine Manager (VMM) </a:t>
-            </a:r>
-            <a:r>
-              <a:rPr lang="en-US" sz="1200" dirty="0">
-                <a:latin typeface="TimesNewRomanPSMT"/>
-              </a:rPr>
-              <a:t>code can run on the system and</a:t>
-            </a:r>
-          </a:p>
-          <a:p>
-            <a:r>
-              <a:rPr lang="en-US" sz="1200" b="1" dirty="0">
-                <a:latin typeface="TimesNewRomanPSMT"/>
-              </a:rPr>
-              <a:t>host multiple guest operating systems</a:t>
-            </a:r>
-            <a:r>
-              <a:rPr lang="en-US" sz="1200" dirty="0">
-                <a:latin typeface="TimesNewRomanPSMT"/>
-              </a:rPr>
-              <a:t>.</a:t>
-            </a:r>
-          </a:p>
-        </p:txBody>
-      </p:sp>
-      <p:pic>
-        <p:nvPicPr>
-          <p:cNvPr id="3" name="Picture 2"/>
-          <p:cNvPicPr>
-            <a:picLocks noChangeAspect="1"/>
-          </p:cNvPicPr>
-          <p:nvPr/>
-        </p:nvPicPr>
-        <p:blipFill>
-          <a:blip r:embed="rId2"/>
-          <a:stretch>
-            <a:fillRect/>
-          </a:stretch>
-        </p:blipFill>
-        <p:spPr>
-          <a:xfrm>
-            <a:off x="1703765" y="3406868"/>
-            <a:ext cx="6133640" cy="3228976"/>
-          </a:xfrm>
-          <a:prstGeom prst="rect">
-            <a:avLst/>
-          </a:prstGeom>
-          <a:effectLst>
-            <a:outerShdw blurRad="63500" sx="102000" sy="102000" algn="ctr" rotWithShape="0">
-              <a:prstClr val="black">
-                <a:alpha val="40000"/>
-              </a:prstClr>
-            </a:outerShdw>
-          </a:effectLst>
-        </p:spPr>
-      </p:pic>
-      <p:sp>
-        <p:nvSpPr>
-          <p:cNvPr id="5" name="Rectangle: Rounded Corners 4"/>
-          <p:cNvSpPr/>
-          <p:nvPr/>
-        </p:nvSpPr>
-        <p:spPr>
-          <a:xfrm>
-            <a:off x="8229600" y="5389684"/>
-            <a:ext cx="2989384" cy="888023"/>
-          </a:xfrm>
-          <a:prstGeom prst="roundRect">
-            <a:avLst/>
-          </a:prstGeom>
-        </p:spPr>
-        <p:style>
-          <a:lnRef idx="2">
-            <a:schemeClr val="accent1">
-              <a:shade val="50000"/>
-            </a:schemeClr>
-          </a:lnRef>
-          <a:fillRef idx="1">
-            <a:schemeClr val="accent1"/>
-          </a:fillRef>
-          <a:effectRef idx="0">
-            <a:schemeClr val="accent1"/>
-          </a:effectRef>
-          <a:fontRef idx="minor">
-            <a:schemeClr val="lt1"/>
-          </a:fontRef>
-        </p:style>
-        <p:txBody>
-          <a:bodyPr rtlCol="0" anchor="ctr"/>
-          <a:lstStyle/>
-          <a:p>
-            <a:pPr algn="just"/>
-            <a:r>
-              <a:rPr lang="en-US" sz="1200" dirty="0">
-                <a:latin typeface="TimesNewRomanPSMT"/>
-              </a:rPr>
-              <a:t>In </a:t>
-            </a:r>
-            <a:r>
-              <a:rPr lang="en-US" sz="1200" b="1" dirty="0">
-                <a:solidFill>
-                  <a:schemeClr val="tx1"/>
-                </a:solidFill>
-                <a:latin typeface="TimesNewRomanPSMT"/>
-              </a:rPr>
-              <a:t>ARMv7-A</a:t>
-            </a:r>
-            <a:r>
-              <a:rPr lang="en-US" sz="1200" dirty="0">
-                <a:latin typeface="TimesNewRomanPSMT"/>
-              </a:rPr>
-              <a:t> architecture, the Secure monitor acts as a gateway for moving between the Normal and Secure worlds.</a:t>
-            </a:r>
-            <a:endParaRPr lang="en-US" sz="1200" dirty="0"/>
+              <a:t>Fundamentals of ARMv8</a:t>
+            </a:r>
+            <a:endParaRPr lang="en-US" dirty="0"/>
           </a:p>
         </p:txBody>
       </p:sp>
     </p:spTree>
     <p:extLst>
       <p:ext uri="{BB962C8B-B14F-4D97-AF65-F5344CB8AC3E}">
-        <p14:creationId xmlns:p14="http://schemas.microsoft.com/office/powerpoint/2010/main" val="2334802442"/>
+        <p14:creationId xmlns:p14="http://schemas.microsoft.com/office/powerpoint/2010/main" val="4005841578"/>
       </p:ext>
     </p:extLst>
   </p:cSld>
@@ -6655,1863 +6029,10 @@
           </a:p>
         </p:txBody>
       </p:sp>
-      <p:sp>
-        <p:nvSpPr>
-          <p:cNvPr id="2" name="Rectangle: Rounded Corners 1"/>
-          <p:cNvSpPr/>
-          <p:nvPr/>
-        </p:nvSpPr>
-        <p:spPr>
-          <a:xfrm>
-            <a:off x="4097215" y="940805"/>
-            <a:ext cx="2110154" cy="413238"/>
-          </a:xfrm>
-          <a:prstGeom prst="roundRect">
-            <a:avLst/>
-          </a:prstGeom>
-        </p:spPr>
-        <p:style>
-          <a:lnRef idx="2">
-            <a:schemeClr val="accent1">
-              <a:shade val="50000"/>
-            </a:schemeClr>
-          </a:lnRef>
-          <a:fillRef idx="1">
-            <a:schemeClr val="accent1"/>
-          </a:fillRef>
-          <a:effectRef idx="0">
-            <a:schemeClr val="accent1"/>
-          </a:effectRef>
-          <a:fontRef idx="minor">
-            <a:schemeClr val="lt1"/>
-          </a:fontRef>
-        </p:style>
-        <p:txBody>
-          <a:bodyPr rtlCol="0" anchor="ctr"/>
-          <a:lstStyle/>
-          <a:p>
-            <a:pPr algn="ctr"/>
-            <a:r>
-              <a:rPr lang="en-US" sz="1200" dirty="0"/>
-              <a:t>Execution States in ARMv8</a:t>
-            </a:r>
-          </a:p>
-        </p:txBody>
-      </p:sp>
-      <p:sp>
-        <p:nvSpPr>
-          <p:cNvPr id="5" name="Rectangle: Rounded Corners 4"/>
-          <p:cNvSpPr/>
-          <p:nvPr/>
-        </p:nvSpPr>
-        <p:spPr>
-          <a:xfrm>
-            <a:off x="1066800" y="1784783"/>
-            <a:ext cx="2110154" cy="413238"/>
-          </a:xfrm>
-          <a:prstGeom prst="roundRect">
-            <a:avLst/>
-          </a:prstGeom>
-        </p:spPr>
-        <p:style>
-          <a:lnRef idx="2">
-            <a:schemeClr val="accent1">
-              <a:shade val="50000"/>
-            </a:schemeClr>
-          </a:lnRef>
-          <a:fillRef idx="1">
-            <a:schemeClr val="accent1"/>
-          </a:fillRef>
-          <a:effectRef idx="0">
-            <a:schemeClr val="accent1"/>
-          </a:effectRef>
-          <a:fontRef idx="minor">
-            <a:schemeClr val="lt1"/>
-          </a:fontRef>
-        </p:style>
-        <p:txBody>
-          <a:bodyPr rtlCol="0" anchor="ctr"/>
-          <a:lstStyle/>
-          <a:p>
-            <a:pPr algn="ctr"/>
-            <a:r>
-              <a:rPr lang="en-US" sz="1200" dirty="0" err="1"/>
-              <a:t>Aarch</a:t>
-            </a:r>
-            <a:r>
-              <a:rPr lang="en-US" sz="1200" dirty="0"/>
-              <a:t> 64</a:t>
-            </a:r>
-          </a:p>
-          <a:p>
-            <a:pPr algn="ctr"/>
-            <a:r>
-              <a:rPr lang="en-US" sz="1000" dirty="0"/>
-              <a:t>[GPR 64bit]</a:t>
-            </a:r>
-          </a:p>
-        </p:txBody>
-      </p:sp>
-      <p:sp>
-        <p:nvSpPr>
-          <p:cNvPr id="6" name="Rectangle: Rounded Corners 5"/>
-          <p:cNvSpPr/>
-          <p:nvPr/>
-        </p:nvSpPr>
-        <p:spPr>
-          <a:xfrm>
-            <a:off x="6951077" y="1784783"/>
-            <a:ext cx="2110154" cy="413238"/>
-          </a:xfrm>
-          <a:prstGeom prst="roundRect">
-            <a:avLst/>
-          </a:prstGeom>
-        </p:spPr>
-        <p:style>
-          <a:lnRef idx="2">
-            <a:schemeClr val="accent1">
-              <a:shade val="50000"/>
-            </a:schemeClr>
-          </a:lnRef>
-          <a:fillRef idx="1">
-            <a:schemeClr val="accent1"/>
-          </a:fillRef>
-          <a:effectRef idx="0">
-            <a:schemeClr val="accent1"/>
-          </a:effectRef>
-          <a:fontRef idx="minor">
-            <a:schemeClr val="lt1"/>
-          </a:fontRef>
-        </p:style>
-        <p:txBody>
-          <a:bodyPr rtlCol="0" anchor="ctr"/>
-          <a:lstStyle/>
-          <a:p>
-            <a:pPr algn="ctr"/>
-            <a:r>
-              <a:rPr lang="en-US" sz="1200" dirty="0" err="1"/>
-              <a:t>Aarch</a:t>
-            </a:r>
-            <a:r>
-              <a:rPr lang="en-US" sz="1200" dirty="0"/>
-              <a:t> 32</a:t>
-            </a:r>
-          </a:p>
-          <a:p>
-            <a:pPr algn="ctr"/>
-            <a:r>
-              <a:rPr lang="en-US" sz="1000" dirty="0"/>
-              <a:t>[GPR 32bit]</a:t>
-            </a:r>
-            <a:endParaRPr lang="en-US" sz="1200" dirty="0"/>
-          </a:p>
-        </p:txBody>
-      </p:sp>
-      <p:cxnSp>
-        <p:nvCxnSpPr>
-          <p:cNvPr id="7" name="Straight Arrow Connector 6"/>
-          <p:cNvCxnSpPr>
-            <a:stCxn id="2" idx="1"/>
-            <a:endCxn id="5" idx="3"/>
-          </p:cNvCxnSpPr>
-          <p:nvPr/>
-        </p:nvCxnSpPr>
-        <p:spPr>
-          <a:xfrm flipH="1">
-            <a:off x="3176954" y="1147424"/>
-            <a:ext cx="920261" cy="843978"/>
-          </a:xfrm>
-          <a:prstGeom prst="straightConnector1">
-            <a:avLst/>
-          </a:prstGeom>
-          <a:ln>
-            <a:tailEnd type="triangle"/>
-          </a:ln>
-        </p:spPr>
-        <p:style>
-          <a:lnRef idx="1">
-            <a:schemeClr val="accent1"/>
-          </a:lnRef>
-          <a:fillRef idx="0">
-            <a:schemeClr val="accent1"/>
-          </a:fillRef>
-          <a:effectRef idx="0">
-            <a:schemeClr val="accent1"/>
-          </a:effectRef>
-          <a:fontRef idx="minor">
-            <a:schemeClr val="tx1"/>
-          </a:fontRef>
-        </p:style>
-      </p:cxnSp>
-      <p:cxnSp>
-        <p:nvCxnSpPr>
-          <p:cNvPr id="9" name="Straight Arrow Connector 8"/>
-          <p:cNvCxnSpPr>
-            <a:stCxn id="2" idx="3"/>
-            <a:endCxn id="6" idx="1"/>
-          </p:cNvCxnSpPr>
-          <p:nvPr/>
-        </p:nvCxnSpPr>
-        <p:spPr>
-          <a:xfrm>
-            <a:off x="6207369" y="1147424"/>
-            <a:ext cx="743708" cy="843978"/>
-          </a:xfrm>
-          <a:prstGeom prst="straightConnector1">
-            <a:avLst/>
-          </a:prstGeom>
-          <a:ln>
-            <a:tailEnd type="triangle"/>
-          </a:ln>
-        </p:spPr>
-        <p:style>
-          <a:lnRef idx="1">
-            <a:schemeClr val="accent1"/>
-          </a:lnRef>
-          <a:fillRef idx="0">
-            <a:schemeClr val="accent1"/>
-          </a:fillRef>
-          <a:effectRef idx="0">
-            <a:schemeClr val="accent1"/>
-          </a:effectRef>
-          <a:fontRef idx="minor">
-            <a:schemeClr val="tx1"/>
-          </a:fontRef>
-        </p:style>
-      </p:cxnSp>
-      <p:sp>
-        <p:nvSpPr>
-          <p:cNvPr id="14" name="Rectangle 13"/>
-          <p:cNvSpPr/>
-          <p:nvPr/>
-        </p:nvSpPr>
-        <p:spPr>
-          <a:xfrm>
-            <a:off x="9755065" y="156796"/>
-            <a:ext cx="2338754" cy="888023"/>
-          </a:xfrm>
-          <a:prstGeom prst="rect">
-            <a:avLst/>
-          </a:prstGeom>
-        </p:spPr>
-        <p:style>
-          <a:lnRef idx="2">
-            <a:schemeClr val="accent1">
-              <a:shade val="50000"/>
-            </a:schemeClr>
-          </a:lnRef>
-          <a:fillRef idx="1">
-            <a:schemeClr val="accent1"/>
-          </a:fillRef>
-          <a:effectRef idx="0">
-            <a:schemeClr val="accent1"/>
-          </a:effectRef>
-          <a:fontRef idx="minor">
-            <a:schemeClr val="lt1"/>
-          </a:fontRef>
-        </p:style>
-        <p:txBody>
-          <a:bodyPr rtlCol="0" anchor="ctr"/>
-          <a:lstStyle/>
-          <a:p>
-            <a:r>
-              <a:rPr lang="en-US" sz="1050" u="sng" dirty="0"/>
-              <a:t>Legends</a:t>
-            </a:r>
-            <a:r>
-              <a:rPr lang="en-US" sz="1050" dirty="0"/>
-              <a:t> : </a:t>
-            </a:r>
-          </a:p>
-          <a:p>
-            <a:endParaRPr lang="en-US" sz="1050" dirty="0"/>
-          </a:p>
-          <a:p>
-            <a:r>
-              <a:rPr lang="en-US" sz="1050" dirty="0"/>
-              <a:t>GPR – General Purpose Registers</a:t>
-            </a:r>
-          </a:p>
-        </p:txBody>
-      </p:sp>
-      <p:sp>
-        <p:nvSpPr>
-          <p:cNvPr id="15" name="TextBox 14"/>
-          <p:cNvSpPr txBox="1"/>
-          <p:nvPr/>
-        </p:nvSpPr>
-        <p:spPr>
-          <a:xfrm>
-            <a:off x="1107831" y="2727866"/>
-            <a:ext cx="2028092" cy="707886"/>
-          </a:xfrm>
-          <a:prstGeom prst="rect">
-            <a:avLst/>
-          </a:prstGeom>
-          <a:gradFill>
-            <a:gsLst>
-              <a:gs pos="0">
-                <a:schemeClr val="accent1">
-                  <a:lumMod val="5000"/>
-                  <a:lumOff val="95000"/>
-                </a:schemeClr>
-              </a:gs>
-              <a:gs pos="74000">
-                <a:schemeClr val="accent1">
-                  <a:lumMod val="45000"/>
-                  <a:lumOff val="55000"/>
-                </a:schemeClr>
-              </a:gs>
-              <a:gs pos="83000">
-                <a:schemeClr val="accent1">
-                  <a:lumMod val="45000"/>
-                  <a:lumOff val="55000"/>
-                </a:schemeClr>
-              </a:gs>
-              <a:gs pos="100000">
-                <a:schemeClr val="accent1">
-                  <a:lumMod val="30000"/>
-                  <a:lumOff val="70000"/>
-                </a:schemeClr>
-              </a:gs>
-            </a:gsLst>
-            <a:lin ang="5400000" scaled="1"/>
-          </a:gradFill>
-          <a:ln>
-            <a:solidFill>
-              <a:schemeClr val="accent1"/>
-            </a:solidFill>
-          </a:ln>
-          <a:effectLst>
-            <a:outerShdw blurRad="152400" dist="1612900" dir="5400000" sx="90000" sy="-19000" rotWithShape="0">
-              <a:prstClr val="black">
-                <a:alpha val="15000"/>
-              </a:prstClr>
-            </a:outerShdw>
-            <a:reflection blurRad="6350" stA="50000" endA="300" endPos="55500" dist="101600" dir="5400000" sy="-100000" algn="bl" rotWithShape="0"/>
-          </a:effectLst>
-        </p:spPr>
-        <p:txBody>
-          <a:bodyPr wrap="square" rtlCol="0">
-            <a:spAutoFit/>
-          </a:bodyPr>
-          <a:lstStyle>
-            <a:defPPr>
-              <a:defRPr lang="en-US"/>
-            </a:defPPr>
-            <a:lvl1pPr marL="171450" indent="-171450">
-              <a:buFont typeface="Arial" panose="020B0604020202020204" pitchFamily="34" charset="0"/>
-              <a:buChar char="•"/>
-              <a:defRPr sz="1000"/>
-            </a:lvl1pPr>
-          </a:lstStyle>
-          <a:p>
-            <a:r>
-              <a:rPr lang="en-US" dirty="0"/>
-              <a:t>Privilege level is determined by Exception Level (EL 0,1,2,3).</a:t>
-            </a:r>
-          </a:p>
-          <a:p>
-            <a:r>
-              <a:rPr lang="en-US" dirty="0"/>
-              <a:t>Executes A64 instruction set.</a:t>
-            </a:r>
-          </a:p>
-        </p:txBody>
-      </p:sp>
-      <p:sp>
-        <p:nvSpPr>
-          <p:cNvPr id="16" name="TextBox 15"/>
-          <p:cNvSpPr txBox="1"/>
-          <p:nvPr/>
-        </p:nvSpPr>
-        <p:spPr>
-          <a:xfrm>
-            <a:off x="6992108" y="2727866"/>
-            <a:ext cx="2028092" cy="861774"/>
-          </a:xfrm>
-          <a:prstGeom prst="rect">
-            <a:avLst/>
-          </a:prstGeom>
-          <a:gradFill>
-            <a:gsLst>
-              <a:gs pos="0">
-                <a:schemeClr val="accent1">
-                  <a:lumMod val="5000"/>
-                  <a:lumOff val="95000"/>
-                </a:schemeClr>
-              </a:gs>
-              <a:gs pos="74000">
-                <a:schemeClr val="accent1">
-                  <a:lumMod val="45000"/>
-                  <a:lumOff val="55000"/>
-                </a:schemeClr>
-              </a:gs>
-              <a:gs pos="83000">
-                <a:schemeClr val="accent1">
-                  <a:lumMod val="45000"/>
-                  <a:lumOff val="55000"/>
-                </a:schemeClr>
-              </a:gs>
-              <a:gs pos="100000">
-                <a:schemeClr val="accent1">
-                  <a:lumMod val="30000"/>
-                  <a:lumOff val="70000"/>
-                </a:schemeClr>
-              </a:gs>
-            </a:gsLst>
-            <a:lin ang="5400000" scaled="1"/>
-          </a:gradFill>
-          <a:ln>
-            <a:solidFill>
-              <a:schemeClr val="accent1"/>
-            </a:solidFill>
-          </a:ln>
-          <a:effectLst>
-            <a:outerShdw blurRad="152400" dist="1612900" dir="5400000" sx="90000" sy="-19000" rotWithShape="0">
-              <a:prstClr val="black">
-                <a:alpha val="15000"/>
-              </a:prstClr>
-            </a:outerShdw>
-            <a:reflection blurRad="6350" stA="50000" endA="300" endPos="55500" dist="101600" dir="5400000" sy="-100000" algn="bl" rotWithShape="0"/>
-          </a:effectLst>
-        </p:spPr>
-        <p:txBody>
-          <a:bodyPr wrap="square" rtlCol="0">
-            <a:spAutoFit/>
-          </a:bodyPr>
-          <a:lstStyle/>
-          <a:p>
-            <a:pPr marL="171450" indent="-171450">
-              <a:buFont typeface="Arial" panose="020B0604020202020204" pitchFamily="34" charset="0"/>
-              <a:buChar char="•"/>
-            </a:pPr>
-            <a:r>
-              <a:rPr lang="en-US" sz="1000" dirty="0"/>
-              <a:t>Retains ARMv7 definitions of </a:t>
-            </a:r>
-            <a:r>
-              <a:rPr lang="en-US" sz="1000" dirty="0" err="1"/>
-              <a:t>priviledge</a:t>
-            </a:r>
-            <a:r>
-              <a:rPr lang="en-US" sz="1000" dirty="0"/>
-              <a:t>.</a:t>
-            </a:r>
-          </a:p>
-          <a:p>
-            <a:pPr marL="171450" indent="-171450">
-              <a:buFont typeface="Arial" panose="020B0604020202020204" pitchFamily="34" charset="0"/>
-              <a:buChar char="•"/>
-            </a:pPr>
-            <a:r>
-              <a:rPr lang="en-US" sz="1000" dirty="0"/>
-              <a:t>Executes either A32 (aka ARM) or T32 (Thumb) instruction sets.</a:t>
-            </a:r>
-          </a:p>
-        </p:txBody>
-      </p:sp>
-      <p:cxnSp>
-        <p:nvCxnSpPr>
-          <p:cNvPr id="18" name="Straight Connector 17"/>
-          <p:cNvCxnSpPr>
-            <a:stCxn id="5" idx="2"/>
-            <a:endCxn id="15" idx="0"/>
-          </p:cNvCxnSpPr>
-          <p:nvPr/>
-        </p:nvCxnSpPr>
-        <p:spPr>
-          <a:xfrm>
-            <a:off x="2121877" y="2198021"/>
-            <a:ext cx="0" cy="529845"/>
-          </a:xfrm>
-          <a:prstGeom prst="line">
-            <a:avLst/>
-          </a:prstGeom>
-          <a:ln w="31750"/>
-        </p:spPr>
-        <p:style>
-          <a:lnRef idx="1">
-            <a:schemeClr val="accent2"/>
-          </a:lnRef>
-          <a:fillRef idx="0">
-            <a:schemeClr val="accent2"/>
-          </a:fillRef>
-          <a:effectRef idx="0">
-            <a:schemeClr val="accent2"/>
-          </a:effectRef>
-          <a:fontRef idx="minor">
-            <a:schemeClr val="tx1"/>
-          </a:fontRef>
-        </p:style>
-      </p:cxnSp>
-      <p:cxnSp>
-        <p:nvCxnSpPr>
-          <p:cNvPr id="20" name="Straight Connector 19"/>
-          <p:cNvCxnSpPr>
-            <a:stCxn id="6" idx="2"/>
-            <a:endCxn id="16" idx="0"/>
-          </p:cNvCxnSpPr>
-          <p:nvPr/>
-        </p:nvCxnSpPr>
-        <p:spPr>
-          <a:xfrm>
-            <a:off x="8006154" y="2198021"/>
-            <a:ext cx="0" cy="529845"/>
-          </a:xfrm>
-          <a:prstGeom prst="line">
-            <a:avLst/>
-          </a:prstGeom>
-          <a:ln w="31750"/>
-        </p:spPr>
-        <p:style>
-          <a:lnRef idx="1">
-            <a:schemeClr val="accent2"/>
-          </a:lnRef>
-          <a:fillRef idx="0">
-            <a:schemeClr val="accent2"/>
-          </a:fillRef>
-          <a:effectRef idx="0">
-            <a:schemeClr val="accent2"/>
-          </a:effectRef>
-          <a:fontRef idx="minor">
-            <a:schemeClr val="tx1"/>
-          </a:fontRef>
-        </p:style>
-      </p:cxnSp>
-      <p:pic>
-        <p:nvPicPr>
-          <p:cNvPr id="21" name="Picture 20"/>
-          <p:cNvPicPr>
-            <a:picLocks noChangeAspect="1"/>
-          </p:cNvPicPr>
-          <p:nvPr/>
-        </p:nvPicPr>
-        <p:blipFill>
-          <a:blip r:embed="rId2"/>
-          <a:stretch>
-            <a:fillRect/>
-          </a:stretch>
-        </p:blipFill>
-        <p:spPr>
-          <a:xfrm>
-            <a:off x="168281" y="3965597"/>
-            <a:ext cx="4356094" cy="2543314"/>
-          </a:xfrm>
-          <a:prstGeom prst="rect">
-            <a:avLst/>
-          </a:prstGeom>
-          <a:effectLst>
-            <a:outerShdw blurRad="63500" sx="102000" sy="102000" algn="ctr" rotWithShape="0">
-              <a:prstClr val="black">
-                <a:alpha val="40000"/>
-              </a:prstClr>
-            </a:outerShdw>
-          </a:effectLst>
-        </p:spPr>
-      </p:pic>
-      <p:pic>
-        <p:nvPicPr>
-          <p:cNvPr id="22" name="Picture 21"/>
-          <p:cNvPicPr>
-            <a:picLocks noChangeAspect="1"/>
-          </p:cNvPicPr>
-          <p:nvPr/>
-        </p:nvPicPr>
-        <p:blipFill>
-          <a:blip r:embed="rId3"/>
-          <a:stretch>
-            <a:fillRect/>
-          </a:stretch>
-        </p:blipFill>
-        <p:spPr>
-          <a:xfrm>
-            <a:off x="5700239" y="3965597"/>
-            <a:ext cx="4611829" cy="2543314"/>
-          </a:xfrm>
-          <a:prstGeom prst="rect">
-            <a:avLst/>
-          </a:prstGeom>
-          <a:effectLst>
-            <a:outerShdw blurRad="63500" sx="102000" sy="102000" algn="ctr" rotWithShape="0">
-              <a:prstClr val="black">
-                <a:alpha val="40000"/>
-              </a:prstClr>
-            </a:outerShdw>
-          </a:effectLst>
-        </p:spPr>
-      </p:pic>
-      <p:cxnSp>
-        <p:nvCxnSpPr>
-          <p:cNvPr id="24" name="Straight Connector 23"/>
-          <p:cNvCxnSpPr/>
-          <p:nvPr/>
-        </p:nvCxnSpPr>
-        <p:spPr>
-          <a:xfrm>
-            <a:off x="5152292" y="1883888"/>
-            <a:ext cx="0" cy="4625023"/>
-          </a:xfrm>
-          <a:prstGeom prst="line">
-            <a:avLst/>
-          </a:prstGeom>
-          <a:ln w="34925"/>
-        </p:spPr>
-        <p:style>
-          <a:lnRef idx="1">
-            <a:schemeClr val="dk1"/>
-          </a:lnRef>
-          <a:fillRef idx="0">
-            <a:schemeClr val="dk1"/>
-          </a:fillRef>
-          <a:effectRef idx="0">
-            <a:schemeClr val="dk1"/>
-          </a:effectRef>
-          <a:fontRef idx="minor">
-            <a:schemeClr val="tx1"/>
-          </a:fontRef>
-        </p:style>
-      </p:cxnSp>
     </p:spTree>
     <p:extLst>
       <p:ext uri="{BB962C8B-B14F-4D97-AF65-F5344CB8AC3E}">
-        <p14:creationId xmlns:p14="http://schemas.microsoft.com/office/powerpoint/2010/main" val="2880313637"/>
-      </p:ext>
-    </p:extLst>
-  </p:cSld>
-  <p:clrMapOvr>
-    <a:masterClrMapping/>
-  </p:clrMapOvr>
-</p:sld>
-</file>
-
-<file path=ppt/slides/slide5.xml><?xml version="1.0" encoding="utf-8"?>
-<p:sld xmlns:a="http://schemas.openxmlformats.org/drawingml/2006/main" xmlns:r="http://schemas.openxmlformats.org/officeDocument/2006/relationships" xmlns:p="http://schemas.openxmlformats.org/presentationml/2006/main">
-  <p:cSld>
-    <p:spTree>
-      <p:nvGrpSpPr>
-        <p:cNvPr id="1" name=""/>
-        <p:cNvGrpSpPr/>
-        <p:nvPr/>
-      </p:nvGrpSpPr>
-      <p:grpSpPr>
-        <a:xfrm>
-          <a:off x="0" y="0"/>
-          <a:ext cx="0" cy="0"/>
-          <a:chOff x="0" y="0"/>
-          <a:chExt cx="0" cy="0"/>
-        </a:xfrm>
-      </p:grpSpPr>
-      <p:sp>
-        <p:nvSpPr>
-          <p:cNvPr id="4" name="Rectangle 3"/>
-          <p:cNvSpPr/>
-          <p:nvPr/>
-        </p:nvSpPr>
-        <p:spPr>
-          <a:xfrm>
-            <a:off x="265286" y="316496"/>
-            <a:ext cx="9010599" cy="369332"/>
-          </a:xfrm>
-          <a:prstGeom prst="rect">
-            <a:avLst/>
-          </a:prstGeom>
-        </p:spPr>
-        <p:txBody>
-          <a:bodyPr wrap="square">
-            <a:spAutoFit/>
-          </a:bodyPr>
-          <a:lstStyle/>
-          <a:p>
-            <a:r>
-              <a:rPr lang="en-US" b="1" dirty="0">
-                <a:latin typeface="Arial-BoldMT"/>
-              </a:rPr>
-              <a:t>Fundamentals of ARMv8 – Changing Exception Levels in ARMv7</a:t>
-            </a:r>
-            <a:endParaRPr lang="en-US" dirty="0"/>
-          </a:p>
-        </p:txBody>
-      </p:sp>
-      <p:sp>
-        <p:nvSpPr>
-          <p:cNvPr id="2" name="Rectangle 1"/>
-          <p:cNvSpPr/>
-          <p:nvPr/>
-        </p:nvSpPr>
-        <p:spPr>
-          <a:xfrm>
-            <a:off x="265286" y="942928"/>
-            <a:ext cx="6096000" cy="246221"/>
-          </a:xfrm>
-          <a:prstGeom prst="rect">
-            <a:avLst/>
-          </a:prstGeom>
-        </p:spPr>
-        <p:txBody>
-          <a:bodyPr>
-            <a:spAutoFit/>
-          </a:bodyPr>
-          <a:lstStyle/>
-          <a:p>
-            <a:pPr marL="171450" indent="-171450">
-              <a:buFont typeface="Arial" panose="020B0604020202020204" pitchFamily="34" charset="0"/>
-              <a:buChar char="•"/>
-            </a:pPr>
-            <a:r>
-              <a:rPr lang="en-US" sz="1000" dirty="0">
-                <a:latin typeface="Trebuchet MS (Body)"/>
-              </a:rPr>
-              <a:t>In the ARMv7 architecture, the processor mode can change under privileged software control.</a:t>
-            </a:r>
-          </a:p>
-        </p:txBody>
-      </p:sp>
-      <p:sp>
-        <p:nvSpPr>
-          <p:cNvPr id="3" name="Rectangle 2"/>
-          <p:cNvSpPr/>
-          <p:nvPr/>
-        </p:nvSpPr>
-        <p:spPr>
-          <a:xfrm>
-            <a:off x="265286" y="1246194"/>
-            <a:ext cx="10065676" cy="246221"/>
-          </a:xfrm>
-          <a:prstGeom prst="rect">
-            <a:avLst/>
-          </a:prstGeom>
-        </p:spPr>
-        <p:txBody>
-          <a:bodyPr wrap="square">
-            <a:spAutoFit/>
-          </a:bodyPr>
-          <a:lstStyle/>
-          <a:p>
-            <a:pPr marL="171450" indent="-171450">
-              <a:buFont typeface="Arial" panose="020B0604020202020204" pitchFamily="34" charset="0"/>
-              <a:buChar char="•"/>
-            </a:pPr>
-            <a:r>
-              <a:rPr lang="en-US" sz="1000" dirty="0">
-                <a:latin typeface="Trebuchet MS (Body)"/>
-              </a:rPr>
-              <a:t>When an exception occurs, the core saves the current execution state and the return address, enters the required mode, and possibly disables hardware interrupts.</a:t>
-            </a:r>
-          </a:p>
-        </p:txBody>
-      </p:sp>
-      <p:sp>
-        <p:nvSpPr>
-          <p:cNvPr id="5" name="Rectangle 4"/>
-          <p:cNvSpPr/>
-          <p:nvPr/>
-        </p:nvSpPr>
-        <p:spPr>
-          <a:xfrm>
-            <a:off x="265286" y="2531954"/>
-            <a:ext cx="4212888" cy="2554545"/>
-          </a:xfrm>
-          <a:prstGeom prst="rect">
-            <a:avLst/>
-          </a:prstGeom>
-        </p:spPr>
-        <p:txBody>
-          <a:bodyPr wrap="square">
-            <a:spAutoFit/>
-          </a:bodyPr>
-          <a:lstStyle/>
-          <a:p>
-            <a:r>
-              <a:rPr lang="en-US" sz="1000" u="sng" dirty="0">
-                <a:latin typeface="Trebuchet MS (Body)"/>
-              </a:rPr>
-              <a:t>:: </a:t>
-            </a:r>
-            <a:r>
-              <a:rPr lang="en-US" sz="1000" b="1" u="sng" dirty="0">
-                <a:latin typeface="Trebuchet MS (Body)"/>
-              </a:rPr>
-              <a:t>Sub-Systems and associated Privilege levels</a:t>
-            </a:r>
-            <a:r>
-              <a:rPr lang="en-US" sz="1000" b="1" dirty="0">
-                <a:latin typeface="Trebuchet MS (Body)"/>
-              </a:rPr>
-              <a:t> ::</a:t>
-            </a:r>
-          </a:p>
-          <a:p>
-            <a:endParaRPr lang="en-US" sz="1000" b="1" dirty="0">
-              <a:latin typeface="Trebuchet MS (Body)"/>
-            </a:endParaRPr>
-          </a:p>
-          <a:p>
-            <a:r>
-              <a:rPr lang="en-US" sz="1000" b="1" dirty="0">
-                <a:latin typeface="Trebuchet MS (Body)"/>
-              </a:rPr>
-              <a:t>Applications </a:t>
-            </a:r>
-            <a:r>
-              <a:rPr lang="en-US" sz="1000" dirty="0">
-                <a:latin typeface="Trebuchet MS (Body)"/>
-              </a:rPr>
-              <a:t>[PL0]	</a:t>
-            </a:r>
-          </a:p>
-          <a:p>
-            <a:pPr marL="171450" indent="-171450">
-              <a:buFont typeface="Arial" panose="020B0604020202020204" pitchFamily="34" charset="0"/>
-              <a:buChar char="•"/>
-            </a:pPr>
-            <a:r>
-              <a:rPr lang="en-US" sz="1000" dirty="0">
-                <a:latin typeface="Trebuchet MS (Body)"/>
-              </a:rPr>
-              <a:t>Unprivileged mode, lowest level of privilege. </a:t>
-            </a:r>
-          </a:p>
-          <a:p>
-            <a:endParaRPr lang="en-US" sz="1000" b="1" dirty="0">
-              <a:latin typeface="Trebuchet MS (Body)"/>
-            </a:endParaRPr>
-          </a:p>
-          <a:p>
-            <a:endParaRPr lang="en-US" sz="1000" b="1" dirty="0">
-              <a:latin typeface="Trebuchet MS (Body)"/>
-            </a:endParaRPr>
-          </a:p>
-          <a:p>
-            <a:r>
-              <a:rPr lang="en-US" sz="1000" b="1" dirty="0">
-                <a:latin typeface="Trebuchet MS (Body)"/>
-              </a:rPr>
-              <a:t>Operating systems</a:t>
-            </a:r>
-            <a:r>
-              <a:rPr lang="en-US" sz="1000" dirty="0">
-                <a:latin typeface="Trebuchet MS (Body)"/>
-              </a:rPr>
-              <a:t> [PL1] </a:t>
-            </a:r>
-          </a:p>
-          <a:p>
-            <a:endParaRPr lang="en-US" sz="1000" dirty="0">
-              <a:latin typeface="Trebuchet MS (Body)"/>
-            </a:endParaRPr>
-          </a:p>
-          <a:p>
-            <a:endParaRPr lang="en-US" sz="1000" dirty="0">
-              <a:latin typeface="Trebuchet MS (Body)"/>
-            </a:endParaRPr>
-          </a:p>
-          <a:p>
-            <a:r>
-              <a:rPr lang="en-US" sz="1000" b="1" dirty="0">
-                <a:latin typeface="Trebuchet MS (Body)"/>
-              </a:rPr>
-              <a:t>Hypervisor</a:t>
-            </a:r>
-            <a:r>
-              <a:rPr lang="en-US" sz="1000" dirty="0">
-                <a:latin typeface="Trebuchet MS (Body)"/>
-              </a:rPr>
-              <a:t> [PL2]	</a:t>
-            </a:r>
-          </a:p>
-          <a:p>
-            <a:pPr marL="171450" indent="-171450">
-              <a:buFont typeface="Arial" panose="020B0604020202020204" pitchFamily="34" charset="0"/>
-              <a:buChar char="•"/>
-            </a:pPr>
-            <a:r>
-              <a:rPr lang="en-US" sz="1000" dirty="0">
-                <a:latin typeface="Trebuchet MS (Body)"/>
-              </a:rPr>
-              <a:t>with the Virtualization extensions</a:t>
-            </a:r>
-          </a:p>
-          <a:p>
-            <a:endParaRPr lang="en-US" sz="1000" dirty="0">
-              <a:latin typeface="Trebuchet MS (Body)"/>
-            </a:endParaRPr>
-          </a:p>
-          <a:p>
-            <a:endParaRPr lang="en-US" sz="1000" dirty="0">
-              <a:latin typeface="Trebuchet MS (Body)"/>
-            </a:endParaRPr>
-          </a:p>
-          <a:p>
-            <a:r>
-              <a:rPr lang="en-US" sz="1000" b="1" dirty="0">
-                <a:latin typeface="Trebuchet MS (Body)"/>
-              </a:rPr>
-              <a:t>Secure monitor</a:t>
-            </a:r>
-            <a:r>
-              <a:rPr lang="en-US" sz="1000" dirty="0">
-                <a:latin typeface="Trebuchet MS (Body)"/>
-              </a:rPr>
-              <a:t> [PL1]	</a:t>
-            </a:r>
-          </a:p>
-          <a:p>
-            <a:pPr marL="171450" indent="-171450">
-              <a:buFont typeface="Arial" panose="020B0604020202020204" pitchFamily="34" charset="0"/>
-              <a:buChar char="•"/>
-            </a:pPr>
-            <a:r>
-              <a:rPr lang="en-US" sz="1000" dirty="0">
-                <a:latin typeface="Trebuchet MS (Body)"/>
-              </a:rPr>
-              <a:t>Acts as a gateway for moving between the Secure and Non-secure (Normal) worlds)</a:t>
-            </a:r>
-          </a:p>
-        </p:txBody>
-      </p:sp>
-      <p:pic>
-        <p:nvPicPr>
-          <p:cNvPr id="7" name="Picture 6"/>
-          <p:cNvPicPr>
-            <a:picLocks noChangeAspect="1"/>
-          </p:cNvPicPr>
-          <p:nvPr/>
-        </p:nvPicPr>
-        <p:blipFill>
-          <a:blip r:embed="rId2"/>
-          <a:stretch>
-            <a:fillRect/>
-          </a:stretch>
-        </p:blipFill>
-        <p:spPr>
-          <a:xfrm>
-            <a:off x="4692764" y="1762005"/>
-            <a:ext cx="7231643" cy="4852456"/>
-          </a:xfrm>
-          <a:prstGeom prst="rect">
-            <a:avLst/>
-          </a:prstGeom>
-          <a:effectLst>
-            <a:outerShdw blurRad="63500" sx="102000" sy="102000" algn="ctr" rotWithShape="0">
-              <a:prstClr val="black">
-                <a:alpha val="40000"/>
-              </a:prstClr>
-            </a:outerShdw>
-          </a:effectLst>
-        </p:spPr>
-      </p:pic>
-    </p:spTree>
-    <p:extLst>
-      <p:ext uri="{BB962C8B-B14F-4D97-AF65-F5344CB8AC3E}">
-        <p14:creationId xmlns:p14="http://schemas.microsoft.com/office/powerpoint/2010/main" val="2275306505"/>
-      </p:ext>
-    </p:extLst>
-  </p:cSld>
-  <p:clrMapOvr>
-    <a:masterClrMapping/>
-  </p:clrMapOvr>
-</p:sld>
-</file>
-
-<file path=ppt/slides/slide6.xml><?xml version="1.0" encoding="utf-8"?>
-<p:sld xmlns:a="http://schemas.openxmlformats.org/drawingml/2006/main" xmlns:r="http://schemas.openxmlformats.org/officeDocument/2006/relationships" xmlns:p="http://schemas.openxmlformats.org/presentationml/2006/main">
-  <p:cSld>
-    <p:spTree>
-      <p:nvGrpSpPr>
-        <p:cNvPr id="1" name=""/>
-        <p:cNvGrpSpPr/>
-        <p:nvPr/>
-      </p:nvGrpSpPr>
-      <p:grpSpPr>
-        <a:xfrm>
-          <a:off x="0" y="0"/>
-          <a:ext cx="0" cy="0"/>
-          <a:chOff x="0" y="0"/>
-          <a:chExt cx="0" cy="0"/>
-        </a:xfrm>
-      </p:grpSpPr>
-      <p:sp>
-        <p:nvSpPr>
-          <p:cNvPr id="4" name="Rectangle 3"/>
-          <p:cNvSpPr/>
-          <p:nvPr/>
-        </p:nvSpPr>
-        <p:spPr>
-          <a:xfrm>
-            <a:off x="265286" y="316496"/>
-            <a:ext cx="9010599" cy="369332"/>
-          </a:xfrm>
-          <a:prstGeom prst="rect">
-            <a:avLst/>
-          </a:prstGeom>
-        </p:spPr>
-        <p:txBody>
-          <a:bodyPr wrap="square">
-            <a:spAutoFit/>
-          </a:bodyPr>
-          <a:lstStyle/>
-          <a:p>
-            <a:r>
-              <a:rPr lang="en-US" b="1" dirty="0">
-                <a:latin typeface="Arial-BoldMT"/>
-              </a:rPr>
-              <a:t>Fundamentals of ARMv8 – Exception Levels in ARMv7</a:t>
-            </a:r>
-            <a:endParaRPr lang="en-US" dirty="0"/>
-          </a:p>
-        </p:txBody>
-      </p:sp>
-      <p:sp>
-        <p:nvSpPr>
-          <p:cNvPr id="2" name="Rectangle 1"/>
-          <p:cNvSpPr/>
-          <p:nvPr/>
-        </p:nvSpPr>
-        <p:spPr>
-          <a:xfrm>
-            <a:off x="265286" y="942928"/>
-            <a:ext cx="6096000" cy="246221"/>
-          </a:xfrm>
-          <a:prstGeom prst="rect">
-            <a:avLst/>
-          </a:prstGeom>
-        </p:spPr>
-        <p:txBody>
-          <a:bodyPr>
-            <a:spAutoFit/>
-          </a:bodyPr>
-          <a:lstStyle/>
-          <a:p>
-            <a:pPr marL="171450" indent="-171450">
-              <a:buFont typeface="Arial" panose="020B0604020202020204" pitchFamily="34" charset="0"/>
-              <a:buChar char="•"/>
-            </a:pPr>
-            <a:r>
-              <a:rPr lang="en-US" sz="1000" dirty="0">
-                <a:latin typeface="Trebuchet MS (Body)"/>
-              </a:rPr>
-              <a:t>Privilege Level Table in previous slide summarized as a block diagram below </a:t>
-            </a:r>
-          </a:p>
-        </p:txBody>
-      </p:sp>
-      <p:pic>
-        <p:nvPicPr>
-          <p:cNvPr id="8" name="Picture 7"/>
-          <p:cNvPicPr>
-            <a:picLocks noChangeAspect="1"/>
-          </p:cNvPicPr>
-          <p:nvPr/>
-        </p:nvPicPr>
-        <p:blipFill>
-          <a:blip r:embed="rId2"/>
-          <a:stretch>
-            <a:fillRect/>
-          </a:stretch>
-        </p:blipFill>
-        <p:spPr>
-          <a:xfrm>
-            <a:off x="3039537" y="1446249"/>
-            <a:ext cx="4429125" cy="5172075"/>
-          </a:xfrm>
-          <a:prstGeom prst="rect">
-            <a:avLst/>
-          </a:prstGeom>
-          <a:effectLst>
-            <a:outerShdw blurRad="63500" sx="102000" sy="102000" algn="ctr" rotWithShape="0">
-              <a:prstClr val="black">
-                <a:alpha val="40000"/>
-              </a:prstClr>
-            </a:outerShdw>
-          </a:effectLst>
-        </p:spPr>
-      </p:pic>
-    </p:spTree>
-    <p:extLst>
-      <p:ext uri="{BB962C8B-B14F-4D97-AF65-F5344CB8AC3E}">
-        <p14:creationId xmlns:p14="http://schemas.microsoft.com/office/powerpoint/2010/main" val="2553256882"/>
-      </p:ext>
-    </p:extLst>
-  </p:cSld>
-  <p:clrMapOvr>
-    <a:masterClrMapping/>
-  </p:clrMapOvr>
-</p:sld>
-</file>
-
-<file path=ppt/slides/slide7.xml><?xml version="1.0" encoding="utf-8"?>
-<p:sld xmlns:a="http://schemas.openxmlformats.org/drawingml/2006/main" xmlns:r="http://schemas.openxmlformats.org/officeDocument/2006/relationships" xmlns:p="http://schemas.openxmlformats.org/presentationml/2006/main">
-  <p:cSld>
-    <p:spTree>
-      <p:nvGrpSpPr>
-        <p:cNvPr id="1" name=""/>
-        <p:cNvGrpSpPr/>
-        <p:nvPr/>
-      </p:nvGrpSpPr>
-      <p:grpSpPr>
-        <a:xfrm>
-          <a:off x="0" y="0"/>
-          <a:ext cx="0" cy="0"/>
-          <a:chOff x="0" y="0"/>
-          <a:chExt cx="0" cy="0"/>
-        </a:xfrm>
-      </p:grpSpPr>
-      <p:sp>
-        <p:nvSpPr>
-          <p:cNvPr id="4" name="Rectangle 3"/>
-          <p:cNvSpPr/>
-          <p:nvPr/>
-        </p:nvSpPr>
-        <p:spPr>
-          <a:xfrm>
-            <a:off x="265286" y="316496"/>
-            <a:ext cx="9010599" cy="369332"/>
-          </a:xfrm>
-          <a:prstGeom prst="rect">
-            <a:avLst/>
-          </a:prstGeom>
-        </p:spPr>
-        <p:txBody>
-          <a:bodyPr wrap="square">
-            <a:spAutoFit/>
-          </a:bodyPr>
-          <a:lstStyle/>
-          <a:p>
-            <a:r>
-              <a:rPr lang="en-US" b="1" dirty="0">
-                <a:latin typeface="Arial-BoldMT"/>
-              </a:rPr>
-              <a:t>Fundamentals of ARMv8 – Exception Levels in ARMv8</a:t>
-            </a:r>
-            <a:endParaRPr lang="en-US" dirty="0"/>
-          </a:p>
-        </p:txBody>
-      </p:sp>
-      <p:sp>
-        <p:nvSpPr>
-          <p:cNvPr id="3" name="Rectangle 2"/>
-          <p:cNvSpPr/>
-          <p:nvPr/>
-        </p:nvSpPr>
-        <p:spPr>
-          <a:xfrm>
-            <a:off x="265285" y="890719"/>
-            <a:ext cx="11583003" cy="553998"/>
-          </a:xfrm>
-          <a:prstGeom prst="rect">
-            <a:avLst/>
-          </a:prstGeom>
-        </p:spPr>
-        <p:txBody>
-          <a:bodyPr>
-            <a:spAutoFit/>
-          </a:bodyPr>
-          <a:lstStyle/>
-          <a:p>
-            <a:pPr marL="171450" indent="-171450">
-              <a:buFont typeface="Arial" panose="020B0604020202020204" pitchFamily="34" charset="0"/>
-              <a:buChar char="•"/>
-            </a:pPr>
-            <a:r>
-              <a:rPr lang="en-US" sz="1000" dirty="0">
-                <a:latin typeface="Trebuchet MS (Body)"/>
-              </a:rPr>
-              <a:t>In AArch64, the processor modes are mapped onto the Exception levels as in </a:t>
-            </a:r>
-            <a:r>
-              <a:rPr lang="en-US" sz="1000" dirty="0">
-                <a:solidFill>
-                  <a:srgbClr val="00B0F0"/>
-                </a:solidFill>
-                <a:latin typeface="Trebuchet MS (Body)"/>
-              </a:rPr>
-              <a:t>Figure 3-6</a:t>
-            </a:r>
-            <a:r>
-              <a:rPr lang="en-US" sz="1000" dirty="0">
-                <a:latin typeface="Trebuchet MS (Body)"/>
-              </a:rPr>
-              <a:t>. </a:t>
-            </a:r>
-          </a:p>
-          <a:p>
-            <a:pPr marL="171450" indent="-171450">
-              <a:buFont typeface="Arial" panose="020B0604020202020204" pitchFamily="34" charset="0"/>
-              <a:buChar char="•"/>
-            </a:pPr>
-            <a:endParaRPr lang="en-US" sz="1000" dirty="0">
-              <a:latin typeface="Trebuchet MS (Body)"/>
-            </a:endParaRPr>
-          </a:p>
-          <a:p>
-            <a:pPr marL="171450" indent="-171450">
-              <a:buFont typeface="Arial" panose="020B0604020202020204" pitchFamily="34" charset="0"/>
-              <a:buChar char="•"/>
-            </a:pPr>
-            <a:r>
-              <a:rPr lang="en-US" sz="1000" dirty="0">
-                <a:latin typeface="Trebuchet MS (Body)"/>
-              </a:rPr>
-              <a:t>Like ARMv7 (AArch32) when an exception is taken, the processor changes to the Exception level (mode) that supports the handling of the exception.</a:t>
-            </a:r>
-          </a:p>
-        </p:txBody>
-      </p:sp>
-      <p:pic>
-        <p:nvPicPr>
-          <p:cNvPr id="5" name="Picture 4"/>
-          <p:cNvPicPr>
-            <a:picLocks noChangeAspect="1"/>
-          </p:cNvPicPr>
-          <p:nvPr/>
-        </p:nvPicPr>
-        <p:blipFill>
-          <a:blip r:embed="rId2"/>
-          <a:stretch>
-            <a:fillRect/>
-          </a:stretch>
-        </p:blipFill>
-        <p:spPr>
-          <a:xfrm>
-            <a:off x="1097290" y="1517849"/>
-            <a:ext cx="7346589" cy="3361587"/>
-          </a:xfrm>
-          <a:prstGeom prst="rect">
-            <a:avLst/>
-          </a:prstGeom>
-          <a:effectLst>
-            <a:outerShdw blurRad="63500" sx="102000" sy="102000" algn="ctr" rotWithShape="0">
-              <a:prstClr val="black">
-                <a:alpha val="40000"/>
-              </a:prstClr>
-            </a:outerShdw>
-          </a:effectLst>
-        </p:spPr>
-      </p:pic>
-      <p:sp>
-        <p:nvSpPr>
-          <p:cNvPr id="6" name="TextBox 5"/>
-          <p:cNvSpPr txBox="1"/>
-          <p:nvPr/>
-        </p:nvSpPr>
-        <p:spPr>
-          <a:xfrm>
-            <a:off x="265285" y="5452900"/>
-            <a:ext cx="10267568" cy="1354217"/>
-          </a:xfrm>
-          <a:prstGeom prst="rect">
-            <a:avLst/>
-          </a:prstGeom>
-          <a:gradFill>
-            <a:gsLst>
-              <a:gs pos="0">
-                <a:schemeClr val="accent1">
-                  <a:lumMod val="5000"/>
-                  <a:lumOff val="95000"/>
-                </a:schemeClr>
-              </a:gs>
-              <a:gs pos="74000">
-                <a:schemeClr val="accent1">
-                  <a:lumMod val="45000"/>
-                  <a:lumOff val="55000"/>
-                </a:schemeClr>
-              </a:gs>
-              <a:gs pos="83000">
-                <a:schemeClr val="accent1">
-                  <a:lumMod val="45000"/>
-                  <a:lumOff val="55000"/>
-                </a:schemeClr>
-              </a:gs>
-              <a:gs pos="100000">
-                <a:schemeClr val="accent1">
-                  <a:lumMod val="30000"/>
-                  <a:lumOff val="70000"/>
-                </a:schemeClr>
-              </a:gs>
-            </a:gsLst>
-            <a:lin ang="5400000" scaled="1"/>
-          </a:gradFill>
-          <a:effectLst>
-            <a:outerShdw blurRad="63500" sx="102000" sy="102000" algn="ctr" rotWithShape="0">
-              <a:prstClr val="black">
-                <a:alpha val="40000"/>
-              </a:prstClr>
-            </a:outerShdw>
-          </a:effectLst>
-        </p:spPr>
-        <p:txBody>
-          <a:bodyPr wrap="square">
-            <a:spAutoFit/>
-          </a:bodyPr>
-          <a:lstStyle>
-            <a:defPPr>
-              <a:defRPr lang="en-US"/>
-            </a:defPPr>
-            <a:lvl1pPr marL="171450" indent="-171450">
-              <a:buFont typeface="Arial" panose="020B0604020202020204" pitchFamily="34" charset="0"/>
-              <a:buChar char="•"/>
-              <a:defRPr sz="1000">
-                <a:latin typeface="Trebuchet MS (Body)"/>
-              </a:defRPr>
-            </a:lvl1pPr>
-          </a:lstStyle>
-          <a:p>
-            <a:pPr marL="0" indent="0">
-              <a:buNone/>
-            </a:pPr>
-            <a:r>
-              <a:rPr lang="en-US" sz="1200" dirty="0">
-                <a:solidFill>
-                  <a:schemeClr val="accent2"/>
-                </a:solidFill>
-              </a:rPr>
-              <a:t>Exception Level Hopping rule(s)</a:t>
-            </a:r>
-          </a:p>
-          <a:p>
-            <a:pPr marL="742950" lvl="1" indent="-285750">
-              <a:buFont typeface="Wingdings" panose="05000000000000000000" pitchFamily="2" charset="2"/>
-              <a:buChar char="q"/>
-            </a:pPr>
-            <a:r>
-              <a:rPr lang="en-US" sz="1000" dirty="0"/>
-              <a:t>Moves to a higher Exception level, (say EL0 </a:t>
-            </a:r>
-            <a:r>
-              <a:rPr lang="en-US" sz="1000" dirty="0">
-                <a:sym typeface="Wingdings" panose="05000000000000000000" pitchFamily="2" charset="2"/>
-              </a:rPr>
-              <a:t></a:t>
-            </a:r>
-            <a:r>
-              <a:rPr lang="en-US" sz="1000" dirty="0"/>
-              <a:t> EL1), indicate increased software execution privilege.</a:t>
-            </a:r>
-          </a:p>
-          <a:p>
-            <a:pPr marL="742950" lvl="1" indent="-285750">
-              <a:buFont typeface="Wingdings" panose="05000000000000000000" pitchFamily="2" charset="2"/>
-              <a:buChar char="q"/>
-            </a:pPr>
-            <a:r>
-              <a:rPr lang="en-US" sz="1000" dirty="0"/>
-              <a:t>exception cannot be taken to a lower Exception level.</a:t>
-            </a:r>
-          </a:p>
-          <a:p>
-            <a:pPr marL="742950" lvl="1" indent="-285750">
-              <a:buFont typeface="Wingdings" panose="05000000000000000000" pitchFamily="2" charset="2"/>
-              <a:buChar char="q"/>
-            </a:pPr>
-            <a:r>
-              <a:rPr lang="en-US" sz="1000" dirty="0"/>
-              <a:t>There is no exception handling at level EL0, exceptions must be handled at a higher Exception level.</a:t>
-            </a:r>
-          </a:p>
-          <a:p>
-            <a:pPr marL="742950" lvl="1" indent="-285750">
-              <a:buFont typeface="Wingdings" panose="05000000000000000000" pitchFamily="2" charset="2"/>
-              <a:buChar char="q"/>
-            </a:pPr>
-            <a:r>
-              <a:rPr lang="en-US" sz="1000" dirty="0"/>
-              <a:t>Execution of an exception handler starts, at an Exception level higher than EL0, from a defined vector that relates to the exception taken.</a:t>
-            </a:r>
-          </a:p>
-          <a:p>
-            <a:pPr marL="742950" lvl="1" indent="-285750">
-              <a:buFont typeface="Wingdings" panose="05000000000000000000" pitchFamily="2" charset="2"/>
-              <a:buChar char="q"/>
-            </a:pPr>
-            <a:r>
-              <a:rPr lang="en-US" sz="1000" dirty="0"/>
-              <a:t>Ending exception handling and returning to the previous Exception level is performed by executing the </a:t>
-            </a:r>
-            <a:r>
-              <a:rPr lang="en-US" sz="1000" b="1" dirty="0">
-                <a:solidFill>
-                  <a:schemeClr val="accent2"/>
-                </a:solidFill>
-              </a:rPr>
-              <a:t>ERET</a:t>
-            </a:r>
-            <a:r>
-              <a:rPr lang="en-US" sz="1000" dirty="0"/>
-              <a:t> instruction</a:t>
-            </a:r>
-          </a:p>
-          <a:p>
-            <a:pPr marL="742950" lvl="1" indent="-285750">
-              <a:buFont typeface="Wingdings" panose="05000000000000000000" pitchFamily="2" charset="2"/>
-              <a:buChar char="q"/>
-            </a:pPr>
-            <a:r>
-              <a:rPr lang="en-US" sz="1000" dirty="0">
-                <a:latin typeface="+mn-lt"/>
-              </a:rPr>
-              <a:t>Returning from an exception can stay at the same Exception level or enter a lower Exception level. (except when retuning from EL3 to a Non-secure state.) </a:t>
-            </a:r>
-          </a:p>
-          <a:p>
-            <a:endParaRPr lang="en-US" dirty="0"/>
-          </a:p>
-        </p:txBody>
-      </p:sp>
-      <p:sp>
-        <p:nvSpPr>
-          <p:cNvPr id="7" name="Rectangle: Rounded Corners 6"/>
-          <p:cNvSpPr/>
-          <p:nvPr/>
-        </p:nvSpPr>
-        <p:spPr>
-          <a:xfrm>
-            <a:off x="8902460" y="3011626"/>
-            <a:ext cx="2764673" cy="1958195"/>
-          </a:xfrm>
-          <a:prstGeom prst="roundRect">
-            <a:avLst/>
-          </a:prstGeom>
-        </p:spPr>
-        <p:style>
-          <a:lnRef idx="2">
-            <a:schemeClr val="accent1">
-              <a:shade val="50000"/>
-            </a:schemeClr>
-          </a:lnRef>
-          <a:fillRef idx="1">
-            <a:schemeClr val="accent1"/>
-          </a:fillRef>
-          <a:effectRef idx="0">
-            <a:schemeClr val="accent1"/>
-          </a:effectRef>
-          <a:fontRef idx="minor">
-            <a:schemeClr val="lt1"/>
-          </a:fontRef>
-        </p:style>
-        <p:txBody>
-          <a:bodyPr rtlCol="0" anchor="ctr"/>
-          <a:lstStyle/>
-          <a:p>
-            <a:r>
-              <a:rPr lang="en-US" sz="1100" u="sng" dirty="0"/>
-              <a:t>Sources of Exception Level Hopping</a:t>
-            </a:r>
-          </a:p>
-          <a:p>
-            <a:endParaRPr lang="en-US" sz="1000" dirty="0"/>
-          </a:p>
-          <a:p>
-            <a:r>
-              <a:rPr lang="en-US" sz="1000" dirty="0"/>
-              <a:t>— Memory system aborts. </a:t>
-            </a:r>
-          </a:p>
-          <a:p>
-            <a:r>
-              <a:rPr lang="en-US" sz="1000" dirty="0"/>
-              <a:t>— Interrupts such as IRQ and FIQ.</a:t>
-            </a:r>
-          </a:p>
-          <a:p>
-            <a:r>
-              <a:rPr lang="en-US" sz="1000" dirty="0"/>
-              <a:t>— Undefined instructions.</a:t>
-            </a:r>
-          </a:p>
-          <a:p>
-            <a:r>
-              <a:rPr lang="en-US" sz="1000" dirty="0"/>
-              <a:t>— System calls. These permit unprivileged software to make a system call to an operating system.</a:t>
-            </a:r>
-          </a:p>
-          <a:p>
-            <a:r>
-              <a:rPr lang="en-US" sz="1000" dirty="0"/>
-              <a:t>— Secure monitor or hypervisor traps.</a:t>
-            </a:r>
-          </a:p>
-        </p:txBody>
-      </p:sp>
-    </p:spTree>
-    <p:extLst>
-      <p:ext uri="{BB962C8B-B14F-4D97-AF65-F5344CB8AC3E}">
-        <p14:creationId xmlns:p14="http://schemas.microsoft.com/office/powerpoint/2010/main" val="3400132291"/>
-      </p:ext>
-    </p:extLst>
-  </p:cSld>
-  <p:clrMapOvr>
-    <a:masterClrMapping/>
-  </p:clrMapOvr>
-</p:sld>
-</file>
-
-<file path=ppt/slides/slide8.xml><?xml version="1.0" encoding="utf-8"?>
-<p:sld xmlns:a="http://schemas.openxmlformats.org/drawingml/2006/main" xmlns:r="http://schemas.openxmlformats.org/officeDocument/2006/relationships" xmlns:p="http://schemas.openxmlformats.org/presentationml/2006/main">
-  <p:cSld>
-    <p:spTree>
-      <p:nvGrpSpPr>
-        <p:cNvPr id="1" name=""/>
-        <p:cNvGrpSpPr/>
-        <p:nvPr/>
-      </p:nvGrpSpPr>
-      <p:grpSpPr>
-        <a:xfrm>
-          <a:off x="0" y="0"/>
-          <a:ext cx="0" cy="0"/>
-          <a:chOff x="0" y="0"/>
-          <a:chExt cx="0" cy="0"/>
-        </a:xfrm>
-      </p:grpSpPr>
-      <p:sp>
-        <p:nvSpPr>
-          <p:cNvPr id="4" name="Rectangle 3"/>
-          <p:cNvSpPr/>
-          <p:nvPr/>
-        </p:nvSpPr>
-        <p:spPr>
-          <a:xfrm>
-            <a:off x="265286" y="316496"/>
-            <a:ext cx="9010599" cy="369332"/>
-          </a:xfrm>
-          <a:prstGeom prst="rect">
-            <a:avLst/>
-          </a:prstGeom>
-        </p:spPr>
-        <p:txBody>
-          <a:bodyPr wrap="square">
-            <a:spAutoFit/>
-          </a:bodyPr>
-          <a:lstStyle/>
-          <a:p>
-            <a:r>
-              <a:rPr lang="en-US" b="1" dirty="0">
-                <a:latin typeface="Arial-BoldMT"/>
-              </a:rPr>
-              <a:t>Fundamentals of ARMv8 – Changing Execution State</a:t>
-            </a:r>
-            <a:endParaRPr lang="en-US" dirty="0"/>
-          </a:p>
-        </p:txBody>
-      </p:sp>
-      <p:sp>
-        <p:nvSpPr>
-          <p:cNvPr id="2" name="Rectangle 1"/>
-          <p:cNvSpPr/>
-          <p:nvPr/>
-        </p:nvSpPr>
-        <p:spPr>
-          <a:xfrm>
-            <a:off x="265285" y="933164"/>
-            <a:ext cx="10897295" cy="861774"/>
-          </a:xfrm>
-          <a:prstGeom prst="rect">
-            <a:avLst/>
-          </a:prstGeom>
-          <a:gradFill>
-            <a:gsLst>
-              <a:gs pos="0">
-                <a:schemeClr val="accent1">
-                  <a:lumMod val="5000"/>
-                  <a:lumOff val="95000"/>
-                </a:schemeClr>
-              </a:gs>
-              <a:gs pos="74000">
-                <a:schemeClr val="accent1">
-                  <a:lumMod val="45000"/>
-                  <a:lumOff val="55000"/>
-                </a:schemeClr>
-              </a:gs>
-              <a:gs pos="83000">
-                <a:schemeClr val="accent1">
-                  <a:lumMod val="45000"/>
-                  <a:lumOff val="55000"/>
-                </a:schemeClr>
-              </a:gs>
-              <a:gs pos="100000">
-                <a:schemeClr val="accent1">
-                  <a:lumMod val="30000"/>
-                  <a:lumOff val="70000"/>
-                </a:schemeClr>
-              </a:gs>
-            </a:gsLst>
-            <a:lin ang="5400000" scaled="1"/>
-          </a:gradFill>
-          <a:effectLst>
-            <a:outerShdw blurRad="63500" sx="102000" sy="102000" algn="ctr" rotWithShape="0">
-              <a:prstClr val="black">
-                <a:alpha val="40000"/>
-              </a:prstClr>
-            </a:outerShdw>
-          </a:effectLst>
-        </p:spPr>
-        <p:txBody>
-          <a:bodyPr wrap="square">
-            <a:spAutoFit/>
-          </a:bodyPr>
-          <a:lstStyle/>
-          <a:p>
-            <a:r>
-              <a:rPr lang="en-US" sz="1400" b="1" u="sng" dirty="0" err="1">
-                <a:latin typeface="TimesNewRomanPSMT"/>
-              </a:rPr>
-              <a:t>Usecase</a:t>
-            </a:r>
-            <a:r>
-              <a:rPr lang="en-US" sz="1400" b="1" dirty="0">
-                <a:latin typeface="TimesNewRomanPSMT"/>
-              </a:rPr>
-              <a:t> : </a:t>
-            </a:r>
-          </a:p>
-          <a:p>
-            <a:pPr marL="171450" indent="-171450">
-              <a:buFont typeface="Arial" panose="020B0604020202020204" pitchFamily="34" charset="0"/>
-              <a:buChar char="•"/>
-            </a:pPr>
-            <a:r>
-              <a:rPr lang="en-US" sz="1200" dirty="0">
-                <a:latin typeface="TimesNewRomanPSMT"/>
-              </a:rPr>
-              <a:t>There are times when you must change the execution state of your system. </a:t>
-            </a:r>
-          </a:p>
-          <a:p>
-            <a:pPr marL="171450" indent="-171450">
-              <a:buFont typeface="Arial" panose="020B0604020202020204" pitchFamily="34" charset="0"/>
-              <a:buChar char="•"/>
-            </a:pPr>
-            <a:r>
-              <a:rPr lang="en-US" sz="1200" dirty="0">
-                <a:latin typeface="TimesNewRomanPSMT"/>
-              </a:rPr>
-              <a:t>Lets suppose, you are running a 64-bit operating system, and want to run a 32-bit application at EL0. </a:t>
-            </a:r>
-          </a:p>
-          <a:p>
-            <a:pPr marL="171450" indent="-171450">
-              <a:buFont typeface="Arial" panose="020B0604020202020204" pitchFamily="34" charset="0"/>
-              <a:buChar char="•"/>
-            </a:pPr>
-            <a:r>
-              <a:rPr lang="en-US" sz="1200" dirty="0">
-                <a:latin typeface="TimesNewRomanPSMT"/>
-              </a:rPr>
-              <a:t>To do this, the system must change to AArch32. When the application has completed or execution returns to the OS, the system can switch back to AArch64.</a:t>
-            </a:r>
-            <a:endParaRPr lang="en-US" sz="1200" dirty="0"/>
-          </a:p>
-        </p:txBody>
-      </p:sp>
-      <p:pic>
-        <p:nvPicPr>
-          <p:cNvPr id="5" name="Picture 4"/>
-          <p:cNvPicPr>
-            <a:picLocks noChangeAspect="1"/>
-          </p:cNvPicPr>
-          <p:nvPr/>
-        </p:nvPicPr>
-        <p:blipFill>
-          <a:blip r:embed="rId2"/>
-          <a:stretch>
-            <a:fillRect/>
-          </a:stretch>
-        </p:blipFill>
-        <p:spPr>
-          <a:xfrm>
-            <a:off x="1871932" y="1958196"/>
-            <a:ext cx="7001688" cy="3124839"/>
-          </a:xfrm>
-          <a:prstGeom prst="rect">
-            <a:avLst/>
-          </a:prstGeom>
-          <a:effectLst>
-            <a:outerShdw blurRad="63500" sx="102000" sy="102000" algn="ctr" rotWithShape="0">
-              <a:prstClr val="black">
-                <a:alpha val="40000"/>
-              </a:prstClr>
-            </a:outerShdw>
-          </a:effectLst>
-        </p:spPr>
-      </p:pic>
-      <p:sp>
-        <p:nvSpPr>
-          <p:cNvPr id="6" name="Rectangle 5"/>
-          <p:cNvSpPr/>
-          <p:nvPr/>
-        </p:nvSpPr>
-        <p:spPr>
-          <a:xfrm>
-            <a:off x="187647" y="5337108"/>
-            <a:ext cx="10897295" cy="1384995"/>
-          </a:xfrm>
-          <a:prstGeom prst="rect">
-            <a:avLst/>
-          </a:prstGeom>
-          <a:gradFill>
-            <a:gsLst>
-              <a:gs pos="0">
-                <a:schemeClr val="accent1">
-                  <a:lumMod val="5000"/>
-                  <a:lumOff val="95000"/>
-                </a:schemeClr>
-              </a:gs>
-              <a:gs pos="74000">
-                <a:schemeClr val="accent1">
-                  <a:lumMod val="45000"/>
-                  <a:lumOff val="55000"/>
-                </a:schemeClr>
-              </a:gs>
-              <a:gs pos="83000">
-                <a:schemeClr val="accent1">
-                  <a:lumMod val="45000"/>
-                  <a:lumOff val="55000"/>
-                </a:schemeClr>
-              </a:gs>
-              <a:gs pos="100000">
-                <a:schemeClr val="accent1">
-                  <a:lumMod val="30000"/>
-                  <a:lumOff val="70000"/>
-                </a:schemeClr>
-              </a:gs>
-            </a:gsLst>
-            <a:lin ang="5400000" scaled="1"/>
-          </a:gradFill>
-          <a:effectLst>
-            <a:outerShdw blurRad="63500" sx="102000" sy="102000" algn="ctr" rotWithShape="0">
-              <a:prstClr val="black">
-                <a:alpha val="40000"/>
-              </a:prstClr>
-            </a:outerShdw>
-          </a:effectLst>
-        </p:spPr>
-        <p:txBody>
-          <a:bodyPr wrap="square">
-            <a:spAutoFit/>
-          </a:bodyPr>
-          <a:lstStyle/>
-          <a:p>
-            <a:r>
-              <a:rPr lang="en-US" sz="1200" b="1" u="sng" dirty="0">
-                <a:latin typeface="TimesNewRomanPSMT"/>
-              </a:rPr>
-              <a:t>Method : </a:t>
-            </a:r>
-          </a:p>
-          <a:p>
-            <a:r>
-              <a:rPr lang="en-US" sz="1200" dirty="0">
-                <a:latin typeface="Trebuchet MS (Body)"/>
-              </a:rPr>
-              <a:t>To change between execution states at the same Exception level, you have to switch to a higher Exception level then return to the original Exception level. </a:t>
-            </a:r>
-          </a:p>
-          <a:p>
-            <a:endParaRPr lang="en-US" sz="1200" dirty="0">
-              <a:latin typeface="Trebuchet MS (Body)"/>
-            </a:endParaRPr>
-          </a:p>
-          <a:p>
-            <a:r>
-              <a:rPr lang="en-US" sz="1200" dirty="0">
-                <a:latin typeface="Trebuchet MS (Body)"/>
-              </a:rPr>
-              <a:t>For example, you might have 32-bit and 64-bit applications running under a 64-bit OS. </a:t>
-            </a:r>
-          </a:p>
-          <a:p>
-            <a:endParaRPr lang="en-US" sz="1200" dirty="0">
-              <a:latin typeface="Trebuchet MS (Body)"/>
-            </a:endParaRPr>
-          </a:p>
-          <a:p>
-            <a:r>
-              <a:rPr lang="en-US" sz="1200" dirty="0">
-                <a:latin typeface="Trebuchet MS (Body)"/>
-              </a:rPr>
-              <a:t>In this case, the 32-bit application can execute and generate a Supervisor Call (SVC) instruction, or receive an interrupt, causing a switch to EL1 and AArch64</a:t>
-            </a:r>
-            <a:r>
-              <a:rPr lang="en-US" sz="1200" dirty="0">
-                <a:latin typeface="TimesNewRomanPSMT"/>
-              </a:rPr>
-              <a:t>. </a:t>
-            </a:r>
-            <a:r>
-              <a:rPr lang="en-US" sz="1200" dirty="0"/>
-              <a:t>The OS can then do a task switch and return to EL0 in AArch64.</a:t>
-            </a:r>
-            <a:endParaRPr lang="en-US" sz="1000" dirty="0">
-              <a:latin typeface="TimesNewRomanPSMT"/>
-            </a:endParaRPr>
-          </a:p>
-        </p:txBody>
-      </p:sp>
-    </p:spTree>
-    <p:extLst>
-      <p:ext uri="{BB962C8B-B14F-4D97-AF65-F5344CB8AC3E}">
-        <p14:creationId xmlns:p14="http://schemas.microsoft.com/office/powerpoint/2010/main" val="67241938"/>
-      </p:ext>
-    </p:extLst>
-  </p:cSld>
-  <p:clrMapOvr>
-    <a:masterClrMapping/>
-  </p:clrMapOvr>
-</p:sld>
-</file>
-
-<file path=ppt/slides/slide9.xml><?xml version="1.0" encoding="utf-8"?>
-<p:sld xmlns:a="http://schemas.openxmlformats.org/drawingml/2006/main" xmlns:r="http://schemas.openxmlformats.org/officeDocument/2006/relationships" xmlns:p="http://schemas.openxmlformats.org/presentationml/2006/main">
-  <p:cSld>
-    <p:spTree>
-      <p:nvGrpSpPr>
-        <p:cNvPr id="1" name=""/>
-        <p:cNvGrpSpPr/>
-        <p:nvPr/>
-      </p:nvGrpSpPr>
-      <p:grpSpPr>
-        <a:xfrm>
-          <a:off x="0" y="0"/>
-          <a:ext cx="0" cy="0"/>
-          <a:chOff x="0" y="0"/>
-          <a:chExt cx="0" cy="0"/>
-        </a:xfrm>
-      </p:grpSpPr>
-      <p:sp>
-        <p:nvSpPr>
-          <p:cNvPr id="4" name="Rectangle 3"/>
-          <p:cNvSpPr/>
-          <p:nvPr/>
-        </p:nvSpPr>
-        <p:spPr>
-          <a:xfrm>
-            <a:off x="265286" y="316496"/>
-            <a:ext cx="9010599" cy="369332"/>
-          </a:xfrm>
-          <a:prstGeom prst="rect">
-            <a:avLst/>
-          </a:prstGeom>
-        </p:spPr>
-        <p:txBody>
-          <a:bodyPr wrap="square">
-            <a:spAutoFit/>
-          </a:bodyPr>
-          <a:lstStyle/>
-          <a:p>
-            <a:r>
-              <a:rPr lang="en-US" b="1" dirty="0">
-                <a:latin typeface="Arial-BoldMT"/>
-              </a:rPr>
-              <a:t>Fundamentals of ARMv8</a:t>
-            </a:r>
-            <a:endParaRPr lang="en-US" dirty="0"/>
-          </a:p>
-        </p:txBody>
-      </p:sp>
-    </p:spTree>
-    <p:extLst>
-      <p:ext uri="{BB962C8B-B14F-4D97-AF65-F5344CB8AC3E}">
-        <p14:creationId xmlns:p14="http://schemas.microsoft.com/office/powerpoint/2010/main" val="647475373"/>
+        <p14:creationId xmlns:p14="http://schemas.microsoft.com/office/powerpoint/2010/main" val="500158562"/>
       </p:ext>
     </p:extLst>
   </p:cSld>

</xml_diff>

<commit_message>
Added new ppt on ARM Architecture
</commit_message>
<xml_diff>
--- a/Presentations/ARM_PPTs/Ch4_ARMv8_Registers.pptx
+++ b/Presentations/ARM_PPTs/Ch4_ARMv8_Registers.pptx
@@ -838,7 +838,7 @@
             <a:fld id="{B61BEF0D-F0BB-DE4B-95CE-6DB70DBA9567}" type="datetimeFigureOut">
               <a:rPr lang="en-US" dirty="0"/>
               <a:pPr/>
-              <a:t>5/18/2017</a:t>
+              <a:t>5/26/2017</a:t>
             </a:fld>
             <a:endParaRPr lang="en-US" dirty="0"/>
           </a:p>
@@ -1086,7 +1086,7 @@
             <a:fld id="{B61BEF0D-F0BB-DE4B-95CE-6DB70DBA9567}" type="datetimeFigureOut">
               <a:rPr lang="en-US" dirty="0"/>
               <a:pPr/>
-              <a:t>5/18/2017</a:t>
+              <a:t>5/26/2017</a:t>
             </a:fld>
             <a:endParaRPr lang="en-US" dirty="0"/>
           </a:p>
@@ -1397,7 +1397,7 @@
             <a:fld id="{B61BEF0D-F0BB-DE4B-95CE-6DB70DBA9567}" type="datetimeFigureOut">
               <a:rPr lang="en-US" dirty="0"/>
               <a:pPr/>
-              <a:t>5/18/2017</a:t>
+              <a:t>5/26/2017</a:t>
             </a:fld>
             <a:endParaRPr lang="en-US" dirty="0"/>
           </a:p>
@@ -1735,7 +1735,7 @@
             <a:fld id="{B61BEF0D-F0BB-DE4B-95CE-6DB70DBA9567}" type="datetimeFigureOut">
               <a:rPr lang="en-US" dirty="0"/>
               <a:pPr/>
-              <a:t>5/18/2017</a:t>
+              <a:t>5/26/2017</a:t>
             </a:fld>
             <a:endParaRPr lang="en-US" dirty="0"/>
           </a:p>
@@ -2046,7 +2046,7 @@
             <a:fld id="{B61BEF0D-F0BB-DE4B-95CE-6DB70DBA9567}" type="datetimeFigureOut">
               <a:rPr lang="en-US" dirty="0"/>
               <a:pPr/>
-              <a:t>5/18/2017</a:t>
+              <a:t>5/26/2017</a:t>
             </a:fld>
             <a:endParaRPr lang="en-US" dirty="0"/>
           </a:p>
@@ -2436,7 +2436,7 @@
             <a:fld id="{B61BEF0D-F0BB-DE4B-95CE-6DB70DBA9567}" type="datetimeFigureOut">
               <a:rPr lang="en-US" dirty="0"/>
               <a:pPr/>
-              <a:t>5/18/2017</a:t>
+              <a:t>5/26/2017</a:t>
             </a:fld>
             <a:endParaRPr lang="en-US" dirty="0"/>
           </a:p>
@@ -2602,7 +2602,7 @@
           <a:p>
             <a:fld id="{55C6B4A9-1611-4792-9094-5F34BCA07E0B}" type="datetimeFigureOut">
               <a:rPr lang="en-US" dirty="0"/>
-              <a:t>5/18/2017</a:t>
+              <a:t>5/26/2017</a:t>
             </a:fld>
             <a:endParaRPr lang="en-US" dirty="0"/>
           </a:p>
@@ -2778,7 +2778,7 @@
             <a:fld id="{B61BEF0D-F0BB-DE4B-95CE-6DB70DBA9567}" type="datetimeFigureOut">
               <a:rPr lang="en-US" dirty="0"/>
               <a:pPr/>
-              <a:t>5/18/2017</a:t>
+              <a:t>5/26/2017</a:t>
             </a:fld>
             <a:endParaRPr lang="en-US" dirty="0"/>
           </a:p>
@@ -2951,7 +2951,7 @@
             <a:fld id="{B61BEF0D-F0BB-DE4B-95CE-6DB70DBA9567}" type="datetimeFigureOut">
               <a:rPr lang="en-US" dirty="0"/>
               <a:pPr/>
-              <a:t>5/18/2017</a:t>
+              <a:t>5/26/2017</a:t>
             </a:fld>
             <a:endParaRPr lang="en-US" dirty="0"/>
           </a:p>
@@ -3195,7 +3195,7 @@
             <a:fld id="{B61BEF0D-F0BB-DE4B-95CE-6DB70DBA9567}" type="datetimeFigureOut">
               <a:rPr lang="en-US" dirty="0"/>
               <a:pPr/>
-              <a:t>5/18/2017</a:t>
+              <a:t>5/26/2017</a:t>
             </a:fld>
             <a:endParaRPr lang="en-US" dirty="0"/>
           </a:p>
@@ -3423,7 +3423,7 @@
           <a:p>
             <a:fld id="{EB712588-04B1-427B-82EE-E8DB90309F08}" type="datetimeFigureOut">
               <a:rPr lang="en-US" dirty="0"/>
-              <a:t>5/18/2017</a:t>
+              <a:t>5/26/2017</a:t>
             </a:fld>
             <a:endParaRPr lang="en-US" dirty="0"/>
           </a:p>
@@ -3793,7 +3793,7 @@
             <a:fld id="{B61BEF0D-F0BB-DE4B-95CE-6DB70DBA9567}" type="datetimeFigureOut">
               <a:rPr lang="en-US" dirty="0"/>
               <a:pPr/>
-              <a:t>5/18/2017</a:t>
+              <a:t>5/26/2017</a:t>
             </a:fld>
             <a:endParaRPr lang="en-US" dirty="0"/>
           </a:p>
@@ -3913,7 +3913,7 @@
             <a:fld id="{B61BEF0D-F0BB-DE4B-95CE-6DB70DBA9567}" type="datetimeFigureOut">
               <a:rPr lang="en-US" dirty="0"/>
               <a:pPr/>
-              <a:t>5/18/2017</a:t>
+              <a:t>5/26/2017</a:t>
             </a:fld>
             <a:endParaRPr lang="en-US" dirty="0"/>
           </a:p>
@@ -4005,7 +4005,7 @@
             <a:fld id="{B61BEF0D-F0BB-DE4B-95CE-6DB70DBA9567}" type="datetimeFigureOut">
               <a:rPr lang="en-US" dirty="0"/>
               <a:pPr/>
-              <a:t>5/18/2017</a:t>
+              <a:t>5/26/2017</a:t>
             </a:fld>
             <a:endParaRPr lang="en-US" dirty="0"/>
           </a:p>
@@ -4256,7 +4256,7 @@
           <a:p>
             <a:fld id="{42A54C80-263E-416B-A8E0-580EDEADCBDC}" type="datetimeFigureOut">
               <a:rPr lang="en-US" dirty="0"/>
-              <a:t>5/18/2017</a:t>
+              <a:t>5/26/2017</a:t>
             </a:fld>
             <a:endParaRPr lang="en-US" dirty="0"/>
           </a:p>
@@ -4515,7 +4515,7 @@
             <a:fld id="{B61BEF0D-F0BB-DE4B-95CE-6DB70DBA9567}" type="datetimeFigureOut">
               <a:rPr lang="en-US" dirty="0"/>
               <a:pPr/>
-              <a:t>5/18/2017</a:t>
+              <a:t>5/26/2017</a:t>
             </a:fld>
             <a:endParaRPr lang="en-US" dirty="0"/>
           </a:p>
@@ -5255,7 +5255,7 @@
             <a:fld id="{B61BEF0D-F0BB-DE4B-95CE-6DB70DBA9567}" type="datetimeFigureOut">
               <a:rPr lang="en-US" dirty="0"/>
               <a:pPr/>
-              <a:t>5/18/2017</a:t>
+              <a:t>5/26/2017</a:t>
             </a:fld>
             <a:endParaRPr lang="en-US" dirty="0"/>
           </a:p>
@@ -5785,7 +5785,12 @@
             <p:ph type="ctrTitle"/>
           </p:nvPr>
         </p:nvSpPr>
-        <p:spPr/>
+        <p:spPr>
+          <a:xfrm>
+            <a:off x="1542236" y="2404534"/>
+            <a:ext cx="7766936" cy="1646302"/>
+          </a:xfrm>
+        </p:spPr>
         <p:txBody>
           <a:bodyPr/>
           <a:lstStyle/>
@@ -5798,12 +5803,6 @@
             <a:br>
               <a:rPr lang="en-US" dirty="0"/>
             </a:br>
-            <a:r>
-              <a:rPr lang="en-US" b="1" dirty="0">
-                <a:latin typeface="Arial-BoldMT"/>
-              </a:rPr>
-              <a:t>Core Architecture  + </a:t>
-            </a:r>
             <a:r>
               <a:rPr lang="en-US" dirty="0"/>
               <a:t>Registers</a:t>

</xml_diff>